<commit_message>
Research Question selected and Presentation created.
</commit_message>
<xml_diff>
--- a/reseach_question_presentation_template.pptx
+++ b/reseach_question_presentation_template.pptx
@@ -5,17 +5,16 @@
     <p:sldMasterId id="2147483648" r:id="rId4"/>
   </p:sldMasterIdLst>
   <p:notesMasterIdLst>
-    <p:notesMasterId r:id="rId10"/>
+    <p:notesMasterId r:id="rId9"/>
   </p:notesMasterIdLst>
   <p:handoutMasterIdLst>
-    <p:handoutMasterId r:id="rId11"/>
+    <p:handoutMasterId r:id="rId10"/>
   </p:handoutMasterIdLst>
   <p:sldIdLst>
     <p:sldId id="289" r:id="rId5"/>
     <p:sldId id="340" r:id="rId6"/>
     <p:sldId id="329" r:id="rId7"/>
     <p:sldId id="336" r:id="rId8"/>
-    <p:sldId id="341" r:id="rId9"/>
   </p:sldIdLst>
   <p:sldSz cx="12192000" cy="6858000"/>
   <p:notesSz cx="6858000" cy="9144000"/>
@@ -832,27 +831,7 @@
           <a:bodyPr/>
           <a:lstStyle/>
           <a:p>
-            <a:r>
-              <a:rPr lang="en-GB"/>
-              <a:t>Before specifying your Research Question you must define the type of data you are analysing.  Are the variables you select interval data (measurement data you can divide, multiple, etc),  OR are they ordinal (there is a definite order but the intervals between each variable are not necessarily equal, or the terms might be subjective like in a </a:t>
-            </a:r>
-            <a:r>
-              <a:rPr lang="en-GB" err="1"/>
-              <a:t>likert</a:t>
-            </a:r>
-            <a:r>
-              <a:rPr lang="en-GB"/>
-              <a:t> scale); OR are they just categorical/nominal (Items such as film names, cities, etc., that you can count numbers of occurrences?   You also need to understand whether the variable is either dependent or independent and this will vary according to the context. Independent variables may cause an effect, whereas the dependent variable might be effected by the independent variable.  Check the lecture notes on the RQ for more information and examples.  </a:t>
-            </a:r>
-          </a:p>
-          <a:p>
             <a:endParaRPr lang="en-GB"/>
-          </a:p>
-          <a:p>
-            <a:r>
-              <a:rPr lang="en-GB"/>
-              <a:t>You will get only one opportunity to present your Research Question ahead of the submission date.  Have your questions ready, and be ready to take notes on feedback.</a:t>
-            </a:r>
           </a:p>
         </p:txBody>
       </p:sp>
@@ -969,91 +948,6 @@
     <p:extLst>
       <p:ext uri="{BB962C8B-B14F-4D97-AF65-F5344CB8AC3E}">
         <p14:creationId xmlns:p14="http://schemas.microsoft.com/office/powerpoint/2010/main" val="2667984944"/>
-      </p:ext>
-    </p:extLst>
-  </p:cSld>
-  <p:clrMapOvr>
-    <a:masterClrMapping/>
-  </p:clrMapOvr>
-</p:notes>
-</file>
-
-<file path=ppt/notesSlides/notesSlide4.xml><?xml version="1.0" encoding="utf-8"?>
-<p:notes xmlns:a="http://schemas.openxmlformats.org/drawingml/2006/main" xmlns:r="http://schemas.openxmlformats.org/officeDocument/2006/relationships" xmlns:p="http://schemas.openxmlformats.org/presentationml/2006/main">
-  <p:cSld>
-    <p:spTree>
-      <p:nvGrpSpPr>
-        <p:cNvPr id="1" name=""/>
-        <p:cNvGrpSpPr/>
-        <p:nvPr/>
-      </p:nvGrpSpPr>
-      <p:grpSpPr>
-        <a:xfrm>
-          <a:off x="0" y="0"/>
-          <a:ext cx="0" cy="0"/>
-          <a:chOff x="0" y="0"/>
-          <a:chExt cx="0" cy="0"/>
-        </a:xfrm>
-      </p:grpSpPr>
-      <p:sp>
-        <p:nvSpPr>
-          <p:cNvPr id="2" name="Slide Image Placeholder 1"/>
-          <p:cNvSpPr>
-            <a:spLocks noGrp="1" noRot="1" noChangeAspect="1"/>
-          </p:cNvSpPr>
-          <p:nvPr>
-            <p:ph type="sldImg"/>
-          </p:nvPr>
-        </p:nvSpPr>
-        <p:spPr/>
-      </p:sp>
-      <p:sp>
-        <p:nvSpPr>
-          <p:cNvPr id="3" name="Notes Placeholder 2"/>
-          <p:cNvSpPr>
-            <a:spLocks noGrp="1"/>
-          </p:cNvSpPr>
-          <p:nvPr>
-            <p:ph type="body" idx="1"/>
-          </p:nvPr>
-        </p:nvSpPr>
-        <p:spPr/>
-        <p:txBody>
-          <a:bodyPr/>
-          <a:lstStyle/>
-          <a:p>
-            <a:endParaRPr lang="en-GB"/>
-          </a:p>
-        </p:txBody>
-      </p:sp>
-      <p:sp>
-        <p:nvSpPr>
-          <p:cNvPr id="4" name="Slide Number Placeholder 3"/>
-          <p:cNvSpPr>
-            <a:spLocks noGrp="1"/>
-          </p:cNvSpPr>
-          <p:nvPr>
-            <p:ph type="sldNum" sz="quarter" idx="5"/>
-          </p:nvPr>
-        </p:nvSpPr>
-        <p:spPr/>
-        <p:txBody>
-          <a:bodyPr/>
-          <a:lstStyle/>
-          <a:p>
-            <a:fld id="{30370952-48CC-46D7-9FCD-59FAD40CC025}" type="slidenum">
-              <a:rPr lang="en-GB" smtClean="0"/>
-              <a:pPr/>
-              <a:t>5</a:t>
-            </a:fld>
-            <a:endParaRPr lang="en-GB"/>
-          </a:p>
-        </p:txBody>
-      </p:sp>
-    </p:spTree>
-    <p:extLst>
-      <p:ext uri="{BB962C8B-B14F-4D97-AF65-F5344CB8AC3E}">
-        <p14:creationId xmlns:p14="http://schemas.microsoft.com/office/powerpoint/2010/main" val="3939429285"/>
       </p:ext>
     </p:extLst>
   </p:cSld>
@@ -4892,7 +4786,7 @@
             </a:br>
             <a:r>
               <a:rPr lang="en-US" sz="2200"/>
-              <a:t>Date: </a:t>
+              <a:t>Date: 19 November 2025</a:t>
             </a:r>
             <a:br>
               <a:rPr lang="en-US" sz="8000"/>
@@ -4924,7 +4818,7 @@
           <a:p>
             <a:r>
               <a:rPr lang="en-US" sz="2000"/>
-              <a:t>Group Name:                                                            Name of Student Presenting:</a:t>
+              <a:t>Group Name: A-199                                                  Name of Student Presenting: Danial Zafa.</a:t>
             </a:r>
           </a:p>
         </p:txBody>
@@ -4957,7 +4851,7 @@
           <a:p>
             <a:r>
               <a:rPr lang="en-GB"/>
-              <a:t>7COM1079-2025  Student Group No:                    Names of Student Attendees  (all group should attend to get feedback): </a:t>
+              <a:t>7COM1079-2025  Student Group No: A-199                  </a:t>
             </a:r>
           </a:p>
         </p:txBody>
@@ -5066,7 +4960,7 @@
           <a:p>
             <a:r>
               <a:rPr lang="en-GB"/>
-              <a:t>PRE 7COM1079-2025  Student Group No:  ?????</a:t>
+              <a:t>PRE 7COM1079-2025  Student Group No:  A-199</a:t>
             </a:r>
           </a:p>
         </p:txBody>
@@ -5099,7 +4993,7 @@
           <a:p>
             <a:r>
               <a:rPr lang="en-US"/>
-              <a:t>3</a:t>
+              <a:t>1</a:t>
             </a:r>
             <a:endParaRPr lang="en-GB"/>
           </a:p>
@@ -5123,13 +5017,13 @@
         </p:nvSpPr>
         <p:spPr>
           <a:xfrm>
-            <a:off x="964884" y="2089858"/>
+            <a:off x="965289" y="1890914"/>
             <a:ext cx="9965844" cy="2649857"/>
           </a:xfrm>
         </p:spPr>
         <p:txBody>
           <a:bodyPr>
-            <a:normAutofit fontScale="90000"/>
+            <a:normAutofit/>
           </a:bodyPr>
           <a:lstStyle/>
           <a:p>
@@ -5145,123 +5039,189 @@
               </a:spcAft>
             </a:pPr>
             <a:r>
-              <a:rPr lang="en-GB" sz="3600">
-                <a:solidFill>
-                  <a:srgbClr val="FF0000"/>
-                </a:solidFill>
+              <a:rPr lang="en-GB" sz="1800" b="0" spc="0">
+                <a:latin typeface="+mn-lt"/>
                 <a:cs typeface="Arial"/>
               </a:rPr>
-              <a:t>Include summary information of your dataset, to include </a:t>
-            </a:r>
-            <a:endParaRPr lang="en-US" sz="3600" b="0">
+              <a:t>Our database represents the weather in the city of London from 1979 to 2020, which was provided by the Eurpean Climate Assessment(ECA). The </a:t>
+            </a:r>
+            <a:r>
+              <a:rPr lang="en-GB" sz="1800" b="0" spc="0">
+                <a:cs typeface="Arial"/>
+              </a:rPr>
+              <a:t>database has 10 columns and 15,341 Rows. We will use </a:t>
+            </a:r>
+            <a:r>
+              <a:rPr lang="en-GB" sz="1800" b="0" spc="0">
+                <a:highlight>
+                  <a:srgbClr val="C0C0C0"/>
+                </a:highlight>
+                <a:latin typeface="Courier New" panose="02070309020205020404" pitchFamily="49" charset="0"/>
+                <a:cs typeface="Courier New" panose="02070309020205020404" pitchFamily="49" charset="0"/>
+              </a:rPr>
+              <a:t>precipitation</a:t>
+            </a:r>
+            <a:r>
+              <a:rPr lang="en-GB" sz="1800" b="0" spc="0">
+                <a:cs typeface="Arial"/>
+              </a:rPr>
+              <a:t>(mm) and </a:t>
+            </a:r>
+            <a:r>
+              <a:rPr lang="en-GB" sz="1800" b="0" spc="0">
+                <a:highlight>
+                  <a:srgbClr val="C0C0C0"/>
+                </a:highlight>
+                <a:latin typeface="Courier New" panose="02070309020205020404" pitchFamily="49" charset="0"/>
+                <a:cs typeface="Courier New" panose="02070309020205020404" pitchFamily="49" charset="0"/>
+              </a:rPr>
+              <a:t>date</a:t>
+            </a:r>
+            <a:r>
+              <a:rPr lang="en-GB" sz="1800" b="0" spc="0">
+                <a:cs typeface="Arial"/>
+              </a:rPr>
+              <a:t> columns.</a:t>
+            </a:r>
+            <a:endParaRPr lang="en-US" sz="1800">
               <a:solidFill>
                 <a:srgbClr val="FF0000"/>
               </a:solidFill>
+              <a:latin typeface="+mn-lt"/>
               <a:cs typeface="Arial"/>
             </a:endParaRPr>
           </a:p>
-          <a:p>
-            <a:pPr marL="742950" indent="-742950">
-              <a:lnSpc>
-                <a:spcPts val="2880"/>
-              </a:lnSpc>
-              <a:spcBef>
-                <a:spcPts val="0"/>
-              </a:spcBef>
-              <a:spcAft>
-                <a:spcPts val="992"/>
-              </a:spcAft>
-              <a:buAutoNum type="arabicPeriod"/>
-            </a:pPr>
-            <a:r>
-              <a:rPr lang="en-GB" sz="3600">
-                <a:solidFill>
-                  <a:srgbClr val="FF0000"/>
-                </a:solidFill>
-                <a:cs typeface="Arial"/>
-              </a:rPr>
-              <a:t>The columns/variable names you include in your research question  (two columns).</a:t>
-            </a:r>
-            <a:endParaRPr lang="en-US" sz="3600" b="0" dirty="0">
-              <a:solidFill>
-                <a:srgbClr val="FF0000"/>
-              </a:solidFill>
-              <a:cs typeface="Arial"/>
-            </a:endParaRPr>
-          </a:p>
-          <a:p>
-            <a:pPr marL="742950" indent="-742950">
-              <a:lnSpc>
-                <a:spcPts val="2880"/>
-              </a:lnSpc>
-              <a:spcBef>
-                <a:spcPts val="0"/>
-              </a:spcBef>
-              <a:spcAft>
-                <a:spcPts val="992"/>
-              </a:spcAft>
-              <a:buAutoNum type="arabicPeriod"/>
-            </a:pPr>
-            <a:r>
-              <a:rPr lang="en-GB" sz="3600">
-                <a:solidFill>
-                  <a:srgbClr val="FF0000"/>
-                </a:solidFill>
-                <a:cs typeface="Arial"/>
-              </a:rPr>
-              <a:t>At least 5 rows of the data</a:t>
-            </a:r>
-            <a:endParaRPr lang="en-US" sz="3600" b="0">
-              <a:solidFill>
-                <a:srgbClr val="FF0000"/>
-              </a:solidFill>
-              <a:cs typeface="Arial"/>
-            </a:endParaRPr>
-          </a:p>
-          <a:p>
-            <a:pPr marL="742950" indent="-742950">
-              <a:lnSpc>
-                <a:spcPts val="2880"/>
-              </a:lnSpc>
-              <a:spcBef>
-                <a:spcPts val="0"/>
-              </a:spcBef>
-              <a:spcAft>
-                <a:spcPts val="992"/>
-              </a:spcAft>
-              <a:buAutoNum type="arabicPeriod"/>
-            </a:pPr>
-            <a:r>
-              <a:rPr lang="en-GB" sz="3600">
-                <a:solidFill>
-                  <a:srgbClr val="FF0000"/>
-                </a:solidFill>
-                <a:cs typeface="Arial"/>
-              </a:rPr>
-              <a:t>Tell us how many rows your dataset has.</a:t>
-            </a:r>
-            <a:br>
-              <a:rPr lang="en-GB" sz="3600" dirty="0">
-                <a:solidFill>
-                  <a:srgbClr val="FF0000"/>
-                </a:solidFill>
-                <a:cs typeface="Arial"/>
-              </a:rPr>
-            </a:br>
-            <a:endParaRPr lang="en-GB" sz="3600">
-              <a:solidFill>
-                <a:srgbClr val="FF0000"/>
-              </a:solidFill>
-              <a:cs typeface="Arial"/>
-            </a:endParaRPr>
-          </a:p>
-          <a:p>
-            <a:endParaRPr lang="en-US">
-              <a:solidFill>
-                <a:srgbClr val="FF0000"/>
-              </a:solidFill>
-              <a:cs typeface="Arial"/>
-            </a:endParaRPr>
+        </p:txBody>
+      </p:sp>
+      <p:pic>
+        <p:nvPicPr>
+          <p:cNvPr id="10" name="Picture 9" descr="A white background with black text and numbers&#10;&#10;AI-generated content may be incorrect.">
+            <a:extLst>
+              <a:ext uri="{FF2B5EF4-FFF2-40B4-BE49-F238E27FC236}">
+                <a16:creationId xmlns:a16="http://schemas.microsoft.com/office/drawing/2014/main" id="{086E223B-F7AA-88DE-ACCD-96150DBF28E0}"/>
+              </a:ext>
+            </a:extLst>
+          </p:cNvPr>
+          <p:cNvPicPr>
+            <a:picLocks noChangeAspect="1"/>
+          </p:cNvPicPr>
+          <p:nvPr/>
+        </p:nvPicPr>
+        <p:blipFill>
+          <a:blip r:embed="rId3">
+            <a:extLst>
+              <a:ext uri="{28A0092B-C50C-407E-A947-70E740481C1C}">
+                <a14:useLocalDpi xmlns:a14="http://schemas.microsoft.com/office/drawing/2010/main" val="0"/>
+              </a:ext>
+            </a:extLst>
+          </a:blip>
+          <a:stretch>
+            <a:fillRect/>
+          </a:stretch>
+        </p:blipFill>
+        <p:spPr>
+          <a:xfrm>
+            <a:off x="694876" y="3321700"/>
+            <a:ext cx="10653815" cy="1660506"/>
+          </a:xfrm>
+          <a:prstGeom prst="rect">
+            <a:avLst/>
+          </a:prstGeom>
+        </p:spPr>
+      </p:pic>
+      <p:sp>
+        <p:nvSpPr>
+          <p:cNvPr id="13" name="Rounded Rectangle 12">
+            <a:extLst>
+              <a:ext uri="{FF2B5EF4-FFF2-40B4-BE49-F238E27FC236}">
+                <a16:creationId xmlns:a16="http://schemas.microsoft.com/office/drawing/2014/main" id="{E4483C8D-7038-FF74-6D5D-2800D42899EB}"/>
+              </a:ext>
+            </a:extLst>
+          </p:cNvPr>
+          <p:cNvSpPr/>
+          <p:nvPr/>
+        </p:nvSpPr>
+        <p:spPr>
+          <a:xfrm>
+            <a:off x="872358" y="3321700"/>
+            <a:ext cx="893379" cy="1660506"/>
+          </a:xfrm>
+          <a:prstGeom prst="roundRect">
+            <a:avLst/>
+          </a:prstGeom>
+          <a:noFill/>
+          <a:ln/>
+        </p:spPr>
+        <p:style>
+          <a:lnRef idx="2">
+            <a:schemeClr val="accent1"/>
+          </a:lnRef>
+          <a:fillRef idx="1">
+            <a:schemeClr val="lt1"/>
+          </a:fillRef>
+          <a:effectRef idx="0">
+            <a:schemeClr val="accent1"/>
+          </a:effectRef>
+          <a:fontRef idx="minor">
+            <a:schemeClr val="dk1"/>
+          </a:fontRef>
+        </p:style>
+        <p:txBody>
+          <a:bodyPr rtlCol="0" anchor="ctr"/>
+          <a:lstStyle/>
+          <a:p>
+            <a:pPr algn="ctr"/>
+            <a:endParaRPr lang="en-US"/>
+          </a:p>
+        </p:txBody>
+      </p:sp>
+      <p:sp>
+        <p:nvSpPr>
+          <p:cNvPr id="14" name="Rounded Rectangle 13">
+            <a:extLst>
+              <a:ext uri="{FF2B5EF4-FFF2-40B4-BE49-F238E27FC236}">
+                <a16:creationId xmlns:a16="http://schemas.microsoft.com/office/drawing/2014/main" id="{6290850E-7D37-1852-35A7-46336419F552}"/>
+              </a:ext>
+            </a:extLst>
+          </p:cNvPr>
+          <p:cNvSpPr/>
+          <p:nvPr/>
+        </p:nvSpPr>
+        <p:spPr>
+          <a:xfrm>
+            <a:off x="8066689" y="3321700"/>
+            <a:ext cx="1329559" cy="1660506"/>
+          </a:xfrm>
+          <a:prstGeom prst="roundRect">
+            <a:avLst/>
+          </a:prstGeom>
+          <a:noFill/>
+          <a:ln>
+            <a:solidFill>
+              <a:schemeClr val="accent1"/>
+            </a:solidFill>
+          </a:ln>
+        </p:spPr>
+        <p:style>
+          <a:lnRef idx="2">
+            <a:schemeClr val="accent6"/>
+          </a:lnRef>
+          <a:fillRef idx="1">
+            <a:schemeClr val="lt1"/>
+          </a:fillRef>
+          <a:effectRef idx="0">
+            <a:schemeClr val="accent6"/>
+          </a:effectRef>
+          <a:fontRef idx="minor">
+            <a:schemeClr val="dk1"/>
+          </a:fontRef>
+        </p:style>
+        <p:txBody>
+          <a:bodyPr rtlCol="0" anchor="ctr"/>
+          <a:lstStyle/>
+          <a:p>
+            <a:pPr algn="ctr"/>
+            <a:endParaRPr lang="en-US"/>
           </a:p>
         </p:txBody>
       </p:sp>
@@ -5333,15 +5293,7 @@
                   <a:srgbClr val="203232"/>
                 </a:solidFill>
               </a:rPr>
-              <a:t>ID</a:t>
-            </a:r>
-            <a:r>
-              <a:rPr lang="en-US" sz="1600">
-                <a:solidFill>
-                  <a:srgbClr val="FF0000"/>
-                </a:solidFill>
-              </a:rPr>
-              <a:t>:   </a:t>
+              <a:t>ID DS134</a:t>
             </a:r>
             <a:r>
               <a:rPr lang="en-US" sz="2400">
@@ -5349,8 +5301,13 @@
                   <a:srgbClr val="FF0000"/>
                 </a:solidFill>
               </a:rPr>
-              <a:t>(replace this text with your DSXXX number and filename)</a:t>
-            </a:r>
+              <a:t> </a:t>
+            </a:r>
+            <a:endParaRPr lang="en-US">
+              <a:solidFill>
+                <a:srgbClr val="203232"/>
+              </a:solidFill>
+            </a:endParaRPr>
           </a:p>
         </p:txBody>
       </p:sp>
@@ -5382,7 +5339,7 @@
           <a:p>
             <a:r>
               <a:rPr lang="en-GB"/>
-              <a:t>7COM1079-2025  Student Group No:                    Names of Student Group Attendees: </a:t>
+              <a:t>7COM1079-2025  Student Group No: A-199                    Names of Student Group Attendees: Danial Zafa.</a:t>
             </a:r>
           </a:p>
         </p:txBody>
@@ -5439,8 +5396,8 @@
         </p:nvSpPr>
         <p:spPr>
           <a:xfrm>
-            <a:off x="965288" y="1698305"/>
-            <a:ext cx="10974945" cy="2699181"/>
+            <a:off x="965288" y="2308657"/>
+            <a:ext cx="10974945" cy="929281"/>
           </a:xfrm>
         </p:spPr>
         <p:txBody>
@@ -5455,21 +5412,11 @@
               </a:lnSpc>
             </a:pPr>
             <a:r>
-              <a:rPr lang="en-US" sz="2400" b="0">
-                <a:latin typeface="Calibri"/>
-                <a:cs typeface="Calibri"/>
+              <a:rPr lang="en-US" sz="1800" b="0" spc="0">
+                <a:latin typeface="Arial" panose="020B0604020202020204" pitchFamily="34" charset="0"/>
+                <a:cs typeface="Arial" panose="020B0604020202020204" pitchFamily="34" charset="0"/>
               </a:rPr>
-              <a:t>This dataset is interesting to us because </a:t>
-            </a:r>
-            <a:r>
-              <a:rPr lang="en-US" sz="2400" b="0">
-                <a:solidFill>
-                  <a:srgbClr val="FF0000"/>
-                </a:solidFill>
-                <a:latin typeface="Calibri"/>
-                <a:cs typeface="Calibri"/>
-              </a:rPr>
-              <a:t>(one sentence):</a:t>
+              <a:t>This dataset is interesting to us because, as newcomers to the city, we want to scientifically compare the data behind London’s world-famous constant rains.</a:t>
             </a:r>
             <a:br>
               <a:rPr lang="en-US" sz="2400" b="0">
@@ -5483,139 +5430,22 @@
                 <a:cs typeface="Calibri" panose="020F0502020204030204" pitchFamily="34" charset="0"/>
               </a:rPr>
             </a:br>
-            <a:r>
-              <a:rPr lang="en-US" sz="2400" b="0" i="1">
-                <a:solidFill>
-                  <a:schemeClr val="accent2">
-                    <a:lumMod val="75000"/>
-                  </a:schemeClr>
-                </a:solidFill>
-                <a:latin typeface="Calibri"/>
-                <a:cs typeface="Calibri"/>
-              </a:rPr>
-              <a:t>From the column headings in your dataset choose ONE independent * and ONE dependent variable . </a:t>
-            </a:r>
-            <a:br>
-              <a:rPr lang="en-US" sz="2400" b="0">
-                <a:latin typeface="Calibri" panose="020F0502020204030204" pitchFamily="34" charset="0"/>
-                <a:cs typeface="Calibri" panose="020F0502020204030204" pitchFamily="34" charset="0"/>
-              </a:rPr>
-            </a:br>
-            <a:r>
-              <a:rPr lang="en-US" sz="2400" b="0">
-                <a:latin typeface="Calibri"/>
-                <a:cs typeface="Calibri"/>
-              </a:rPr>
-              <a:t>Our  Independent variable is: (</a:t>
-            </a:r>
-            <a:r>
-              <a:rPr lang="en-US" sz="2400" b="0">
-                <a:solidFill>
-                  <a:srgbClr val="FF0000"/>
-                </a:solidFill>
-                <a:latin typeface="Calibri"/>
-                <a:cs typeface="Calibri"/>
-              </a:rPr>
-              <a:t>the variable that remains constant /could cause an effect  on dep var)</a:t>
-            </a:r>
-            <a:br>
-              <a:rPr lang="en-US" sz="2400" b="0">
-                <a:latin typeface="Calibri" panose="020F0502020204030204" pitchFamily="34" charset="0"/>
-                <a:cs typeface="Calibri" panose="020F0502020204030204" pitchFamily="34" charset="0"/>
-              </a:rPr>
-            </a:br>
-            <a:r>
-              <a:rPr lang="en-US" sz="2400" b="0">
-                <a:solidFill>
-                  <a:srgbClr val="FF0000"/>
-                </a:solidFill>
-                <a:latin typeface="Calibri"/>
-                <a:cs typeface="Calibri"/>
-              </a:rPr>
-              <a:t>                   </a:t>
-            </a:r>
-            <a:r>
-              <a:rPr lang="en-US" sz="2400" b="0">
-                <a:latin typeface="Calibri"/>
-                <a:cs typeface="Calibri"/>
-              </a:rPr>
-              <a:t>This  Independent variable datatype is (select one): </a:t>
-            </a:r>
-            <a:r>
-              <a:rPr lang="en-US" sz="2400" b="0">
-                <a:solidFill>
-                  <a:srgbClr val="FF0000"/>
-                </a:solidFill>
-                <a:latin typeface="Calibri"/>
-                <a:cs typeface="Calibri"/>
-              </a:rPr>
-              <a:t>Nominal/categorial  OR Ordinal OR Interval/measurement data.</a:t>
-            </a:r>
-            <a:br>
-              <a:rPr lang="en-US" sz="2400" b="0">
-                <a:latin typeface="Calibri" panose="020F0502020204030204" pitchFamily="34" charset="0"/>
-                <a:cs typeface="Calibri" panose="020F0502020204030204" pitchFamily="34" charset="0"/>
-              </a:rPr>
-            </a:br>
-            <a:r>
-              <a:rPr lang="en-US" sz="2400" b="0">
-                <a:latin typeface="Calibri"/>
-                <a:cs typeface="Calibri"/>
-              </a:rPr>
-              <a:t>Our Dependent variable is: </a:t>
-            </a:r>
-            <a:r>
-              <a:rPr lang="en-US" sz="2400" b="0">
-                <a:solidFill>
-                  <a:srgbClr val="FF0000"/>
-                </a:solidFill>
-                <a:latin typeface="Calibri"/>
-                <a:cs typeface="Calibri"/>
-              </a:rPr>
-              <a:t>(your outcome variable that answers your RQ)</a:t>
-            </a:r>
-            <a:br>
-              <a:rPr lang="en-US" sz="2400" b="0">
-                <a:latin typeface="Calibri" panose="020F0502020204030204" pitchFamily="34" charset="0"/>
-                <a:cs typeface="Calibri" panose="020F0502020204030204" pitchFamily="34" charset="0"/>
-              </a:rPr>
-            </a:br>
-            <a:r>
-              <a:rPr lang="en-US" sz="2400" b="0">
-                <a:solidFill>
-                  <a:srgbClr val="FF0000"/>
-                </a:solidFill>
-                <a:latin typeface="Calibri"/>
-                <a:cs typeface="Calibri"/>
-              </a:rPr>
-              <a:t>                   </a:t>
-            </a:r>
-            <a:r>
-              <a:rPr lang="en-US" sz="2400" b="0">
-                <a:latin typeface="Calibri"/>
-                <a:cs typeface="Calibri"/>
-              </a:rPr>
-              <a:t>This Dependent variable datatype is  (select one): </a:t>
-            </a:r>
-            <a:r>
-              <a:rPr lang="en-US" sz="2400" b="0">
-                <a:solidFill>
-                  <a:srgbClr val="FF0000"/>
-                </a:solidFill>
-                <a:latin typeface="Calibri"/>
-                <a:cs typeface="Calibri"/>
-              </a:rPr>
-              <a:t>Nominal/categorial  OR Ordinal OR Interval/measurement data</a:t>
-            </a:r>
-          </a:p>
-        </p:txBody>
-      </p:sp>
-      <p:sp>
-        <p:nvSpPr>
-          <p:cNvPr id="6" name="TextBox 5">
-            <a:extLst>
-              <a:ext uri="{FF2B5EF4-FFF2-40B4-BE49-F238E27FC236}">
-                <a16:creationId xmlns:a16="http://schemas.microsoft.com/office/drawing/2014/main" id="{732D6C0D-D649-2AA9-7741-835F3E841A25}"/>
+            <a:endParaRPr lang="en-US" sz="2400" b="0">
+              <a:solidFill>
+                <a:srgbClr val="FF0000"/>
+              </a:solidFill>
+              <a:latin typeface="Calibri"/>
+              <a:cs typeface="Calibri"/>
+            </a:endParaRPr>
+          </a:p>
+        </p:txBody>
+      </p:sp>
+      <p:sp>
+        <p:nvSpPr>
+          <p:cNvPr id="7" name="TextBox 6">
+            <a:extLst>
+              <a:ext uri="{FF2B5EF4-FFF2-40B4-BE49-F238E27FC236}">
+                <a16:creationId xmlns:a16="http://schemas.microsoft.com/office/drawing/2014/main" id="{C6DD2984-9707-1D90-D131-42E743E94208}"/>
               </a:ext>
             </a:extLst>
           </p:cNvPr>
@@ -5624,8 +5454,8 @@
         </p:nvSpPr>
         <p:spPr>
           <a:xfrm>
-            <a:off x="6766560" y="5385816"/>
-            <a:ext cx="4187952" cy="1200329"/>
+            <a:off x="830716" y="3654222"/>
+            <a:ext cx="10746596" cy="338554"/>
           </a:xfrm>
           <a:prstGeom prst="rect">
             <a:avLst/>
@@ -5633,20 +5463,56 @@
           <a:noFill/>
         </p:spPr>
         <p:txBody>
-          <a:bodyPr wrap="square" rtlCol="0">
+          <a:bodyPr wrap="none" rtlCol="0">
             <a:spAutoFit/>
           </a:bodyPr>
           <a:lstStyle/>
           <a:p>
             <a:r>
-              <a:rPr lang="en-GB">
-                <a:solidFill>
-                  <a:schemeClr val="accent2">
-                    <a:lumMod val="75000"/>
-                  </a:schemeClr>
-                </a:solidFill>
+              <a:rPr lang="en-US" sz="1600" b="1"/>
+              <a:t>Independent Variable: </a:t>
+            </a:r>
+            <a:r>
+              <a:rPr lang="en-US" sz="1600">
+                <a:highlight>
+                  <a:srgbClr val="C0C0C0"/>
+                </a:highlight>
+                <a:latin typeface="Courier New" panose="02070309020205020404" pitchFamily="49" charset="0"/>
+                <a:cs typeface="Courier New" panose="02070309020205020404" pitchFamily="49" charset="0"/>
               </a:rPr>
-              <a:t>*For comparison of two nominal variables and for comparison of proportions you use two (or more) independent variables (see next slide)</a:t>
+              <a:t>date</a:t>
+            </a:r>
+            <a:r>
+              <a:rPr lang="en-US" sz="1600" b="1"/>
+              <a:t> ==&gt; </a:t>
+            </a:r>
+            <a:r>
+              <a:rPr lang="en-US" sz="1600">
+                <a:highlight>
+                  <a:srgbClr val="C0C0C0"/>
+                </a:highlight>
+                <a:latin typeface="Courier New" panose="02070309020205020404" pitchFamily="49" charset="0"/>
+                <a:cs typeface="Courier New" panose="02070309020205020404" pitchFamily="49" charset="0"/>
+              </a:rPr>
+              <a:t>Season</a:t>
+            </a:r>
+            <a:r>
+              <a:rPr lang="en-US" sz="1600" b="1"/>
+              <a:t> (Nominal)         |         Dependent Variable: </a:t>
+            </a:r>
+            <a:r>
+              <a:rPr lang="en-US" sz="1600">
+                <a:highlight>
+                  <a:srgbClr val="C0C0C0"/>
+                </a:highlight>
+                <a:latin typeface="Courier New" panose="02070309020205020404" pitchFamily="49" charset="0"/>
+                <a:cs typeface="Courier New" panose="02070309020205020404" pitchFamily="49" charset="0"/>
+              </a:rPr>
+              <a:t>precipitation</a:t>
+            </a:r>
+            <a:r>
+              <a:rPr lang="en-US" sz="1600" b="1"/>
+              <a:t> (Interval)</a:t>
             </a:r>
           </a:p>
         </p:txBody>
@@ -5714,16 +5580,13 @@
             </a:pPr>
             <a:r>
               <a:rPr lang="en-GB"/>
-              <a:t>Our Research Question is </a:t>
-            </a:r>
-            <a:r>
-              <a:rPr lang="en-GB" sz="1800">
-                <a:solidFill>
-                  <a:srgbClr val="FF0000"/>
-                </a:solidFill>
-              </a:rPr>
-              <a:t>Choose ONE of the three templates below replacing the blue text with your variables – then add hypotheses as shown in next slide:</a:t>
-            </a:r>
+              <a:t>Our Research Question is</a:t>
+            </a:r>
+            <a:endParaRPr lang="en-GB" sz="1800">
+              <a:solidFill>
+                <a:srgbClr val="FF0000"/>
+              </a:solidFill>
+            </a:endParaRPr>
           </a:p>
         </p:txBody>
       </p:sp>
@@ -5750,7 +5613,7 @@
           <a:p>
             <a:r>
               <a:rPr lang="en-GB"/>
-              <a:t>PRE 7COM1079-2025  Student Group No:  ?????</a:t>
+              <a:t>PRE 7COM1079-2025  Student Group No:  A-199</a:t>
             </a:r>
           </a:p>
         </p:txBody>
@@ -5807,8 +5670,8 @@
         </p:nvSpPr>
         <p:spPr>
           <a:xfrm>
-            <a:off x="965289" y="1893914"/>
-            <a:ext cx="10640594" cy="2678085"/>
+            <a:off x="965288" y="1944884"/>
+            <a:ext cx="10640594" cy="514112"/>
           </a:xfrm>
         </p:spPr>
         <p:txBody>
@@ -5823,412 +5686,266 @@
               </a:lnSpc>
             </a:pPr>
             <a:r>
-              <a:rPr lang="en-IE" sz="2400">
-                <a:effectLst/>
-                <a:latin typeface="Calibri"/>
+              <a:rPr lang="en-IE" sz="1800" b="0" spc="0">
+                <a:latin typeface="Arial" panose="020B0604020202020204" pitchFamily="34" charset="0"/>
                 <a:ea typeface="Calibri" panose="020F0502020204030204" pitchFamily="34" charset="0"/>
-                <a:cs typeface="Times New Roman"/>
+                <a:cs typeface="Arial" panose="020B0604020202020204" pitchFamily="34" charset="0"/>
               </a:rPr>
-              <a:t>Template </a:t>
-            </a:r>
-            <a:r>
-              <a:rPr lang="en-IE" sz="2400" baseline="30000">
-                <a:effectLst/>
-                <a:latin typeface="Calibri"/>
+              <a:t>Is there a difference in the mean of daily </a:t>
+            </a:r>
+            <a:r>
+              <a:rPr lang="en-IE" sz="1800" spc="0">
+                <a:latin typeface="Arial" panose="020B0604020202020204" pitchFamily="34" charset="0"/>
                 <a:ea typeface="Calibri" panose="020F0502020204030204" pitchFamily="34" charset="0"/>
-                <a:cs typeface="Times New Roman"/>
+                <a:cs typeface="Arial" panose="020B0604020202020204" pitchFamily="34" charset="0"/>
               </a:rPr>
-              <a:t>1</a:t>
-            </a:r>
-            <a:r>
-              <a:rPr lang="en-IE" sz="2400">
-                <a:effectLst/>
-                <a:latin typeface="Calibri"/>
+              <a:t>precipitation</a:t>
+            </a:r>
+            <a:r>
+              <a:rPr lang="en-IE" sz="1800" b="0" spc="0">
+                <a:latin typeface="Arial" panose="020B0604020202020204" pitchFamily="34" charset="0"/>
                 <a:ea typeface="Calibri" panose="020F0502020204030204" pitchFamily="34" charset="0"/>
-                <a:cs typeface="Times New Roman"/>
+                <a:cs typeface="Arial" panose="020B0604020202020204" pitchFamily="34" charset="0"/>
               </a:rPr>
-              <a:t>: </a:t>
-            </a:r>
-            <a:r>
-              <a:rPr lang="en-IE" sz="2400" b="0">
-                <a:effectLst/>
-                <a:latin typeface="Calibri"/>
+              <a:t> among the </a:t>
+            </a:r>
+            <a:r>
+              <a:rPr lang="en-IE" sz="1800" spc="0">
+                <a:latin typeface="Arial" panose="020B0604020202020204" pitchFamily="34" charset="0"/>
                 <a:ea typeface="Calibri" panose="020F0502020204030204" pitchFamily="34" charset="0"/>
-                <a:cs typeface="Times New Roman"/>
+                <a:cs typeface="Arial" panose="020B0604020202020204" pitchFamily="34" charset="0"/>
               </a:rPr>
-              <a:t>Interval/Ordinal vs Interval/Ordinal: “Is there a correlation between </a:t>
-            </a:r>
-            <a:r>
-              <a:rPr lang="en-IE" sz="2400" b="0">
+              <a:t>seasons</a:t>
+            </a:r>
+            <a:r>
+              <a:rPr lang="en-IE" sz="1800" b="0" spc="0">
+                <a:latin typeface="Arial" panose="020B0604020202020204" pitchFamily="34" charset="0"/>
+                <a:ea typeface="Calibri" panose="020F0502020204030204" pitchFamily="34" charset="0"/>
+                <a:cs typeface="Arial" panose="020B0604020202020204" pitchFamily="34" charset="0"/>
+              </a:rPr>
+              <a:t>?</a:t>
+            </a:r>
+            <a:endParaRPr lang="en-GB" sz="1800" b="0" spc="0">
+              <a:solidFill>
+                <a:srgbClr val="FF0000"/>
+              </a:solidFill>
+              <a:latin typeface="Arial" panose="020B0604020202020204" pitchFamily="34" charset="0"/>
+              <a:cs typeface="Arial" panose="020B0604020202020204" pitchFamily="34" charset="0"/>
+            </a:endParaRPr>
+          </a:p>
+        </p:txBody>
+      </p:sp>
+      <p:sp>
+        <p:nvSpPr>
+          <p:cNvPr id="6" name="Subtitle 1">
+            <a:extLst>
+              <a:ext uri="{FF2B5EF4-FFF2-40B4-BE49-F238E27FC236}">
+                <a16:creationId xmlns:a16="http://schemas.microsoft.com/office/drawing/2014/main" id="{28ACD5C1-E397-77DD-B851-CD0276A55D20}"/>
+              </a:ext>
+            </a:extLst>
+          </p:cNvPr>
+          <p:cNvSpPr txBox="1">
+            <a:spLocks/>
+          </p:cNvSpPr>
+          <p:nvPr/>
+        </p:nvSpPr>
+        <p:spPr>
+          <a:xfrm>
+            <a:off x="965288" y="2917168"/>
+            <a:ext cx="9753625" cy="230832"/>
+          </a:xfrm>
+          <a:prstGeom prst="rect">
+            <a:avLst/>
+          </a:prstGeom>
+        </p:spPr>
+        <p:txBody>
+          <a:bodyPr vert="horz" lIns="0" tIns="0" rIns="0" bIns="0" rtlCol="0">
+            <a:noAutofit/>
+          </a:bodyPr>
+          <a:lstStyle>
+            <a:lvl1pPr marL="0" indent="0" algn="l" defTabSz="914400" rtl="0" eaLnBrk="1" latinLnBrk="0" hangingPunct="1">
+              <a:lnSpc>
+                <a:spcPts val="2880"/>
+              </a:lnSpc>
+              <a:spcBef>
+                <a:spcPts val="0"/>
+              </a:spcBef>
+              <a:spcAft>
+                <a:spcPts val="992"/>
+              </a:spcAft>
+              <a:buFont typeface="Arial" panose="020B0604020202020204" pitchFamily="34" charset="0"/>
+              <a:buNone/>
+              <a:defRPr sz="3600" b="1" kern="3000" spc="-100" baseline="0">
                 <a:solidFill>
-                  <a:srgbClr val="0070C0"/>
+                  <a:schemeClr val="tx2"/>
                 </a:solidFill>
-                <a:effectLst/>
-                <a:latin typeface="Calibri"/>
-                <a:ea typeface="Calibri" panose="020F0502020204030204" pitchFamily="34" charset="0"/>
-                <a:cs typeface="Times New Roman"/>
-              </a:rPr>
-              <a:t>[dependent interval </a:t>
-            </a:r>
-            <a:r>
-              <a:rPr lang="en-IE" sz="2400" b="0">
-                <a:effectLst/>
-                <a:latin typeface="Calibri"/>
-                <a:ea typeface="Calibri" panose="020F0502020204030204" pitchFamily="34" charset="0"/>
-                <a:cs typeface="Times New Roman"/>
-              </a:rPr>
-              <a:t>or</a:t>
-            </a:r>
-            <a:r>
-              <a:rPr lang="en-IE" sz="2400" b="0">
+                <a:latin typeface="+mn-lt"/>
+                <a:ea typeface="+mn-ea"/>
+                <a:cs typeface="+mn-cs"/>
+              </a:defRPr>
+            </a:lvl1pPr>
+            <a:lvl2pPr marL="457200" indent="0" algn="ctr" defTabSz="914400" rtl="0" eaLnBrk="1" latinLnBrk="0" hangingPunct="1">
+              <a:lnSpc>
+                <a:spcPts val="2880"/>
+              </a:lnSpc>
+              <a:spcBef>
+                <a:spcPts val="0"/>
+              </a:spcBef>
+              <a:spcAft>
+                <a:spcPts val="992"/>
+              </a:spcAft>
+              <a:buFont typeface="Arial" panose="020B0604020202020204" pitchFamily="34" charset="0"/>
+              <a:buNone/>
+              <a:defRPr sz="2000" kern="2000" spc="-100" baseline="0">
                 <a:solidFill>
-                  <a:srgbClr val="0070C0"/>
+                  <a:srgbClr val="203232"/>
                 </a:solidFill>
-                <a:effectLst/>
-                <a:latin typeface="Calibri"/>
-                <a:ea typeface="Calibri" panose="020F0502020204030204" pitchFamily="34" charset="0"/>
-                <a:cs typeface="Times New Roman"/>
-              </a:rPr>
-              <a:t> ordinal variable] </a:t>
-            </a:r>
-            <a:r>
-              <a:rPr lang="en-IE" sz="2400" b="0">
-                <a:effectLst/>
-                <a:latin typeface="Calibri"/>
-                <a:ea typeface="Calibri" panose="020F0502020204030204" pitchFamily="34" charset="0"/>
-                <a:cs typeface="Times New Roman"/>
-              </a:rPr>
-              <a:t>and </a:t>
-            </a:r>
-            <a:r>
-              <a:rPr lang="en-IE" sz="2400" b="0">
+                <a:latin typeface="+mn-lt"/>
+                <a:ea typeface="+mn-ea"/>
+                <a:cs typeface="+mn-cs"/>
+              </a:defRPr>
+            </a:lvl2pPr>
+            <a:lvl3pPr marL="914400" indent="0" algn="ctr" defTabSz="914400" rtl="0" eaLnBrk="1" latinLnBrk="0" hangingPunct="1">
+              <a:lnSpc>
+                <a:spcPts val="2880"/>
+              </a:lnSpc>
+              <a:spcBef>
+                <a:spcPts val="0"/>
+              </a:spcBef>
+              <a:spcAft>
+                <a:spcPts val="992"/>
+              </a:spcAft>
+              <a:buFont typeface="Arial" panose="020B0604020202020204" pitchFamily="34" charset="0"/>
+              <a:buNone/>
+              <a:defRPr sz="1800" kern="2000" spc="-100" baseline="0">
                 <a:solidFill>
-                  <a:srgbClr val="0070C0"/>
+                  <a:srgbClr val="203232"/>
                 </a:solidFill>
-                <a:effectLst/>
-                <a:latin typeface="Calibri"/>
-                <a:ea typeface="Calibri" panose="020F0502020204030204" pitchFamily="34" charset="0"/>
-                <a:cs typeface="Times New Roman"/>
-              </a:rPr>
-              <a:t>[independent interval </a:t>
-            </a:r>
-            <a:r>
-              <a:rPr lang="en-IE" sz="2400" b="0">
-                <a:effectLst/>
-                <a:latin typeface="Calibri"/>
-                <a:ea typeface="Calibri" panose="020F0502020204030204" pitchFamily="34" charset="0"/>
-                <a:cs typeface="Times New Roman"/>
-              </a:rPr>
-              <a:t>or</a:t>
-            </a:r>
-            <a:r>
-              <a:rPr lang="en-IE" sz="2400" b="0">
+                <a:latin typeface="+mn-lt"/>
+                <a:ea typeface="+mn-ea"/>
+                <a:cs typeface="+mn-cs"/>
+              </a:defRPr>
+            </a:lvl3pPr>
+            <a:lvl4pPr marL="1371600" indent="0" algn="ctr" defTabSz="914400" rtl="0" eaLnBrk="1" latinLnBrk="0" hangingPunct="1">
+              <a:lnSpc>
+                <a:spcPts val="2160"/>
+              </a:lnSpc>
+              <a:spcBef>
+                <a:spcPts val="0"/>
+              </a:spcBef>
+              <a:buFont typeface="Arial" panose="020B0604020202020204" pitchFamily="34" charset="0"/>
+              <a:buNone/>
+              <a:defRPr sz="1600" kern="1200">
                 <a:solidFill>
-                  <a:srgbClr val="0070C0"/>
+                  <a:srgbClr val="203232"/>
                 </a:solidFill>
-                <a:effectLst/>
-                <a:latin typeface="Calibri"/>
-                <a:ea typeface="Calibri" panose="020F0502020204030204" pitchFamily="34" charset="0"/>
-                <a:cs typeface="Times New Roman"/>
-              </a:rPr>
-              <a:t> ordinal variable?]”</a:t>
-            </a:r>
-            <a:r>
-              <a:rPr lang="en-IE" sz="2400" b="0">
-                <a:effectLst/>
-                <a:latin typeface="Calibri"/>
-                <a:ea typeface="Calibri" panose="020F0502020204030204" pitchFamily="34" charset="0"/>
-                <a:cs typeface="Times New Roman"/>
-              </a:rPr>
-              <a:t>. </a:t>
-            </a:r>
-            <a:br>
-              <a:rPr lang="en-IE" sz="2400">
-                <a:effectLst/>
-                <a:latin typeface="Calibri" panose="020F0502020204030204" pitchFamily="34" charset="0"/>
-                <a:ea typeface="Calibri" panose="020F0502020204030204" pitchFamily="34" charset="0"/>
-                <a:cs typeface="Times New Roman" panose="02020603050405020304" pitchFamily="18" charset="0"/>
-              </a:rPr>
-            </a:br>
-            <a:br>
-              <a:rPr lang="en-IE" sz="2400">
-                <a:effectLst/>
-                <a:latin typeface="Calibri" panose="020F0502020204030204" pitchFamily="34" charset="0"/>
-                <a:ea typeface="Calibri" panose="020F0502020204030204" pitchFamily="34" charset="0"/>
-                <a:cs typeface="Times New Roman" panose="02020603050405020304" pitchFamily="18" charset="0"/>
-              </a:rPr>
-            </a:br>
-            <a:r>
-              <a:rPr lang="en-IE" sz="2400">
-                <a:effectLst/>
-                <a:latin typeface="Calibri"/>
-                <a:ea typeface="Calibri" panose="020F0502020204030204" pitchFamily="34" charset="0"/>
-                <a:cs typeface="Times New Roman"/>
-              </a:rPr>
-              <a:t>Template</a:t>
-            </a:r>
-            <a:r>
-              <a:rPr lang="en-IE" sz="2400" baseline="30000">
-                <a:effectLst/>
-                <a:latin typeface="Calibri"/>
-                <a:ea typeface="Calibri" panose="020F0502020204030204" pitchFamily="34" charset="0"/>
-                <a:cs typeface="Times New Roman"/>
-              </a:rPr>
-              <a:t>2</a:t>
-            </a:r>
-            <a:r>
-              <a:rPr lang="en-IE" sz="2400">
-                <a:effectLst/>
-                <a:latin typeface="Calibri"/>
-                <a:ea typeface="Calibri" panose="020F0502020204030204" pitchFamily="34" charset="0"/>
-                <a:cs typeface="Times New Roman"/>
-              </a:rPr>
-              <a:t> :</a:t>
-            </a:r>
-            <a:r>
-              <a:rPr lang="en-IE" sz="2400" b="0">
-                <a:effectLst/>
-                <a:latin typeface="Calibri"/>
-                <a:ea typeface="Calibri" panose="020F0502020204030204" pitchFamily="34" charset="0"/>
-                <a:cs typeface="Times New Roman"/>
-              </a:rPr>
-              <a:t>Interval/Ordinal vs Nominal. data “Is there a difference in the mean of </a:t>
-            </a:r>
-            <a:r>
-              <a:rPr lang="en-IE" sz="2400" b="0">
+                <a:latin typeface="+mn-lt"/>
+                <a:ea typeface="+mn-ea"/>
+                <a:cs typeface="+mn-cs"/>
+              </a:defRPr>
+            </a:lvl4pPr>
+            <a:lvl5pPr marL="1828800" indent="0" algn="ctr" defTabSz="914400" rtl="0" eaLnBrk="1" latinLnBrk="0" hangingPunct="1">
+              <a:lnSpc>
+                <a:spcPts val="2160"/>
+              </a:lnSpc>
+              <a:spcBef>
+                <a:spcPts val="0"/>
+              </a:spcBef>
+              <a:buFont typeface="Arial" panose="020B0604020202020204" pitchFamily="34" charset="0"/>
+              <a:buNone/>
+              <a:defRPr sz="1600" b="1" kern="1200">
                 <a:solidFill>
-                  <a:srgbClr val="0070C0"/>
+                  <a:srgbClr val="203232"/>
                 </a:solidFill>
-                <a:effectLst/>
-                <a:latin typeface="Calibri"/>
-                <a:ea typeface="Calibri" panose="020F0502020204030204" pitchFamily="34" charset="0"/>
-                <a:cs typeface="Times New Roman"/>
-              </a:rPr>
-              <a:t>[dependent interval variable </a:t>
-            </a:r>
-            <a:r>
-              <a:rPr lang="en-IE" sz="2400" b="0">
+                <a:latin typeface="+mn-lt"/>
+                <a:ea typeface="+mn-ea"/>
+                <a:cs typeface="+mn-cs"/>
+              </a:defRPr>
+            </a:lvl5pPr>
+            <a:lvl6pPr marL="2286000" indent="0" algn="ctr" defTabSz="914400" rtl="0" eaLnBrk="1" latinLnBrk="0" hangingPunct="1">
+              <a:lnSpc>
+                <a:spcPct val="90000"/>
+              </a:lnSpc>
+              <a:spcBef>
+                <a:spcPts val="500"/>
+              </a:spcBef>
+              <a:buFont typeface="Arial" panose="020B0604020202020204" pitchFamily="34" charset="0"/>
+              <a:buNone/>
+              <a:defRPr sz="1600" kern="1200">
                 <a:solidFill>
-                  <a:srgbClr val="0070C0"/>
+                  <a:schemeClr val="tx1"/>
                 </a:solidFill>
-                <a:latin typeface="Calibri"/>
-                <a:ea typeface="Calibri" panose="020F0502020204030204" pitchFamily="34" charset="0"/>
-                <a:cs typeface="Times New Roman"/>
-              </a:rPr>
-              <a:t> </a:t>
-            </a:r>
-            <a:r>
-              <a:rPr lang="en-IE" sz="2400" b="0">
-                <a:latin typeface="Calibri"/>
-                <a:ea typeface="Calibri" panose="020F0502020204030204" pitchFamily="34" charset="0"/>
-                <a:cs typeface="Times New Roman"/>
-              </a:rPr>
-              <a:t>or</a:t>
-            </a:r>
-            <a:r>
-              <a:rPr lang="en-IE" sz="2400" b="0">
-                <a:effectLst/>
-                <a:latin typeface="Calibri"/>
-                <a:ea typeface="Calibri" panose="020F0502020204030204" pitchFamily="34" charset="0"/>
-                <a:cs typeface="Times New Roman"/>
-              </a:rPr>
-              <a:t> </a:t>
-            </a:r>
-            <a:r>
-              <a:rPr lang="en-IE" sz="2400" b="0">
+                <a:latin typeface="+mn-lt"/>
+                <a:ea typeface="+mn-ea"/>
+                <a:cs typeface="+mn-cs"/>
+              </a:defRPr>
+            </a:lvl6pPr>
+            <a:lvl7pPr marL="2743200" indent="0" algn="ctr" defTabSz="914400" rtl="0" eaLnBrk="1" latinLnBrk="0" hangingPunct="1">
+              <a:lnSpc>
+                <a:spcPct val="90000"/>
+              </a:lnSpc>
+              <a:spcBef>
+                <a:spcPts val="500"/>
+              </a:spcBef>
+              <a:buFont typeface="Arial" panose="020B0604020202020204" pitchFamily="34" charset="0"/>
+              <a:buNone/>
+              <a:defRPr sz="1600" kern="1200">
                 <a:solidFill>
-                  <a:srgbClr val="0070C0"/>
+                  <a:schemeClr val="tx1"/>
                 </a:solidFill>
-                <a:effectLst/>
-                <a:latin typeface="Calibri"/>
-                <a:ea typeface="Calibri" panose="020F0502020204030204" pitchFamily="34" charset="0"/>
-                <a:cs typeface="Times New Roman"/>
-              </a:rPr>
-              <a:t> dependent ordinal variable] </a:t>
-            </a:r>
-            <a:r>
-              <a:rPr lang="en-IE" sz="2400" b="0">
-                <a:effectLst/>
-                <a:latin typeface="Calibri"/>
-                <a:ea typeface="Calibri" panose="020F0502020204030204" pitchFamily="34" charset="0"/>
-                <a:cs typeface="Times New Roman"/>
-              </a:rPr>
-              <a:t>between</a:t>
-            </a:r>
-            <a:r>
-              <a:rPr lang="en-IE" sz="2400" b="0">
-                <a:latin typeface="Calibri"/>
-                <a:ea typeface="Calibri" panose="020F0502020204030204" pitchFamily="34" charset="0"/>
-                <a:cs typeface="Times New Roman"/>
-              </a:rPr>
-              <a:t>/among</a:t>
-            </a:r>
-            <a:r>
-              <a:rPr lang="en-IE" sz="2400" b="0">
-                <a:effectLst/>
-                <a:latin typeface="Calibri"/>
-                <a:ea typeface="Calibri" panose="020F0502020204030204" pitchFamily="34" charset="0"/>
-                <a:cs typeface="Times New Roman"/>
-              </a:rPr>
-              <a:t> </a:t>
-            </a:r>
-            <a:r>
-              <a:rPr lang="en-IE" sz="2400" b="0">
+                <a:latin typeface="+mn-lt"/>
+                <a:ea typeface="+mn-ea"/>
+                <a:cs typeface="+mn-cs"/>
+              </a:defRPr>
+            </a:lvl7pPr>
+            <a:lvl8pPr marL="3200400" indent="0" algn="ctr" defTabSz="914400" rtl="0" eaLnBrk="1" latinLnBrk="0" hangingPunct="1">
+              <a:lnSpc>
+                <a:spcPct val="90000"/>
+              </a:lnSpc>
+              <a:spcBef>
+                <a:spcPts val="500"/>
+              </a:spcBef>
+              <a:buFont typeface="Arial" panose="020B0604020202020204" pitchFamily="34" charset="0"/>
+              <a:buNone/>
+              <a:defRPr sz="1600" kern="1200">
                 <a:solidFill>
-                  <a:srgbClr val="0070C0"/>
+                  <a:schemeClr val="tx1"/>
                 </a:solidFill>
-                <a:effectLst/>
-                <a:latin typeface="Calibri"/>
-                <a:ea typeface="Calibri" panose="020F0502020204030204" pitchFamily="34" charset="0"/>
-                <a:cs typeface="Times New Roman"/>
-              </a:rPr>
-              <a:t>[independent nominal variable] and [independent nominal variable?]</a:t>
-            </a:r>
-            <a:r>
-              <a:rPr lang="en-IE" sz="2400" b="0">
-                <a:effectLst/>
-                <a:latin typeface="Calibri"/>
-                <a:ea typeface="Calibri" panose="020F0502020204030204" pitchFamily="34" charset="0"/>
-                <a:cs typeface="Times New Roman"/>
-              </a:rPr>
-              <a:t>”.</a:t>
-            </a:r>
-            <a:br>
-              <a:rPr lang="en-GB" sz="2400" b="0">
-                <a:effectLst/>
-                <a:latin typeface="Calibri" panose="020F0502020204030204" pitchFamily="34" charset="0"/>
-                <a:ea typeface="Calibri" panose="020F0502020204030204" pitchFamily="34" charset="0"/>
-                <a:cs typeface="Times New Roman" panose="02020603050405020304" pitchFamily="18" charset="0"/>
-              </a:rPr>
-            </a:br>
-            <a:br>
-              <a:rPr lang="en-IE" sz="2400">
-                <a:effectLst/>
-                <a:latin typeface="Calibri" panose="020F0502020204030204" pitchFamily="34" charset="0"/>
-                <a:ea typeface="Calibri" panose="020F0502020204030204" pitchFamily="34" charset="0"/>
-                <a:cs typeface="Times New Roman" panose="02020603050405020304" pitchFamily="18" charset="0"/>
-              </a:rPr>
-            </a:br>
-            <a:r>
-              <a:rPr lang="en-IE" sz="2400">
+                <a:latin typeface="+mn-lt"/>
+                <a:ea typeface="+mn-ea"/>
+                <a:cs typeface="+mn-cs"/>
+              </a:defRPr>
+            </a:lvl8pPr>
+            <a:lvl9pPr marL="3657600" indent="0" algn="ctr" defTabSz="914400" rtl="0" eaLnBrk="1" latinLnBrk="0" hangingPunct="1">
+              <a:lnSpc>
+                <a:spcPct val="90000"/>
+              </a:lnSpc>
+              <a:spcBef>
+                <a:spcPts val="500"/>
+              </a:spcBef>
+              <a:buFont typeface="Arial" panose="020B0604020202020204" pitchFamily="34" charset="0"/>
+              <a:buNone/>
+              <a:defRPr sz="1600" kern="1200">
                 <a:solidFill>
-                  <a:srgbClr val="000000"/>
+                  <a:schemeClr val="tx1"/>
                 </a:solidFill>
-                <a:effectLst/>
-                <a:latin typeface="Calibri"/>
-                <a:ea typeface="Calibri" panose="020F0502020204030204" pitchFamily="34" charset="0"/>
-                <a:cs typeface="Times New Roman"/>
-              </a:rPr>
-              <a:t>Template </a:t>
-            </a:r>
-            <a:r>
-              <a:rPr lang="en-IE" sz="2400" baseline="30000">
-                <a:solidFill>
-                  <a:srgbClr val="000000"/>
-                </a:solidFill>
-                <a:effectLst/>
-                <a:latin typeface="Calibri"/>
-                <a:ea typeface="Calibri" panose="020F0502020204030204" pitchFamily="34" charset="0"/>
-                <a:cs typeface="Times New Roman"/>
-              </a:rPr>
-              <a:t>3</a:t>
-            </a:r>
-            <a:r>
-              <a:rPr lang="en-IE" sz="2400">
-                <a:solidFill>
-                  <a:srgbClr val="000000"/>
-                </a:solidFill>
-                <a:effectLst/>
-                <a:latin typeface="Calibri"/>
-                <a:ea typeface="Calibri" panose="020F0502020204030204" pitchFamily="34" charset="0"/>
-                <a:cs typeface="Times New Roman"/>
-              </a:rPr>
-              <a:t>:  </a:t>
-            </a:r>
-            <a:r>
-              <a:rPr lang="en-IE" sz="2400" b="0">
-                <a:solidFill>
-                  <a:srgbClr val="000000"/>
-                </a:solidFill>
-                <a:effectLst/>
-                <a:latin typeface="Calibri"/>
-                <a:ea typeface="Calibri" panose="020F0502020204030204" pitchFamily="34" charset="0"/>
-                <a:cs typeface="Times New Roman"/>
-              </a:rPr>
-              <a:t>Nominal vs Nominal  data (frequencies): “</a:t>
-            </a:r>
-            <a:r>
-              <a:rPr lang="en-IE" sz="2400" b="0">
-                <a:effectLst/>
-                <a:latin typeface="Calibri"/>
-                <a:ea typeface="Calibri" panose="020F0502020204030204" pitchFamily="34" charset="0"/>
-                <a:cs typeface="Times New Roman"/>
-              </a:rPr>
-              <a:t>Is there a difference in proportions of </a:t>
-            </a:r>
-            <a:r>
-              <a:rPr lang="en-IE" sz="2400" b="0">
-                <a:solidFill>
-                  <a:srgbClr val="0070C0"/>
-                </a:solidFill>
-                <a:effectLst/>
-                <a:latin typeface="Calibri"/>
-                <a:ea typeface="Calibri" panose="020F0502020204030204" pitchFamily="34" charset="0"/>
-                <a:cs typeface="Times New Roman"/>
-              </a:rPr>
-              <a:t>[dependent nominal variable] </a:t>
-            </a:r>
-            <a:r>
-              <a:rPr lang="en-IE" sz="2400" b="0">
-                <a:effectLst/>
-                <a:latin typeface="Calibri"/>
-                <a:ea typeface="Calibri" panose="020F0502020204030204" pitchFamily="34" charset="0"/>
-                <a:cs typeface="Times New Roman"/>
-              </a:rPr>
-              <a:t>between </a:t>
-            </a:r>
-            <a:r>
-              <a:rPr lang="en-IE" sz="2400" b="0">
-                <a:solidFill>
-                  <a:srgbClr val="0070C0"/>
-                </a:solidFill>
-                <a:effectLst/>
-                <a:latin typeface="Calibri"/>
-                <a:ea typeface="Calibri" panose="020F0502020204030204" pitchFamily="34" charset="0"/>
-                <a:cs typeface="Times New Roman"/>
-              </a:rPr>
-              <a:t>[independent nominal variable] </a:t>
-            </a:r>
-            <a:r>
-              <a:rPr lang="en-IE" sz="2400" b="0">
-                <a:effectLst/>
-                <a:latin typeface="Calibri"/>
-                <a:ea typeface="Calibri" panose="020F0502020204030204" pitchFamily="34" charset="0"/>
-                <a:cs typeface="Times New Roman"/>
-              </a:rPr>
-              <a:t>and </a:t>
-            </a:r>
-            <a:r>
-              <a:rPr lang="en-IE" sz="2400" b="0">
-                <a:solidFill>
-                  <a:srgbClr val="0070C0"/>
-                </a:solidFill>
-                <a:effectLst/>
-                <a:latin typeface="Calibri"/>
-                <a:ea typeface="Calibri" panose="020F0502020204030204" pitchFamily="34" charset="0"/>
-                <a:cs typeface="Times New Roman"/>
-              </a:rPr>
-              <a:t>[independent nominal variable]?”</a:t>
-            </a:r>
-            <a:br>
-              <a:rPr lang="en-GB" sz="2400">
-                <a:effectLst/>
-                <a:latin typeface="Calibri" panose="020F0502020204030204" pitchFamily="34" charset="0"/>
-                <a:ea typeface="Calibri" panose="020F0502020204030204" pitchFamily="34" charset="0"/>
-                <a:cs typeface="Times New Roman" panose="02020603050405020304" pitchFamily="18" charset="0"/>
-              </a:rPr>
-            </a:br>
-            <a:endParaRPr lang="en-GB" sz="2400">
+                <a:latin typeface="+mn-lt"/>
+                <a:ea typeface="+mn-ea"/>
+                <a:cs typeface="+mn-cs"/>
+              </a:defRPr>
+            </a:lvl9pPr>
+          </a:lstStyle>
+          <a:p>
+            <a:pPr>
+              <a:spcAft>
+                <a:spcPts val="0"/>
+              </a:spcAft>
+            </a:pPr>
+            <a:r>
+              <a:rPr lang="en-GB"/>
+              <a:t>Our Research Hypotheses are</a:t>
+            </a:r>
+            <a:endParaRPr lang="en-GB" sz="1800">
               <a:solidFill>
                 <a:srgbClr val="FF0000"/>
               </a:solidFill>
@@ -6238,794 +5955,308 @@
       </p:sp>
       <p:sp>
         <p:nvSpPr>
-          <p:cNvPr id="7" name="TextBox 6">
-            <a:extLst>
-              <a:ext uri="{FF2B5EF4-FFF2-40B4-BE49-F238E27FC236}">
-                <a16:creationId xmlns:a16="http://schemas.microsoft.com/office/drawing/2014/main" id="{F7FEA660-7B39-BC91-3B96-7298CCF66DE1}"/>
-              </a:ext>
-            </a:extLst>
-          </p:cNvPr>
-          <p:cNvSpPr txBox="1"/>
+          <p:cNvPr id="14" name="Rectangle 4">
+            <a:extLst>
+              <a:ext uri="{FF2B5EF4-FFF2-40B4-BE49-F238E27FC236}">
+                <a16:creationId xmlns:a16="http://schemas.microsoft.com/office/drawing/2014/main" id="{F24476E1-4B33-AF97-80E0-6074B944523A}"/>
+              </a:ext>
+            </a:extLst>
+          </p:cNvPr>
+          <p:cNvSpPr>
+            <a:spLocks noChangeArrowheads="1"/>
+          </p:cNvSpPr>
           <p:nvPr/>
         </p:nvSpPr>
-        <p:spPr>
+        <p:spPr bwMode="auto">
           <a:xfrm>
-            <a:off x="623945" y="5297755"/>
-            <a:ext cx="11440040" cy="1477328"/>
-          </a:xfrm>
-          <a:prstGeom prst="rect">
-            <a:avLst/>
-          </a:prstGeom>
-          <a:solidFill>
-            <a:schemeClr val="bg1">
-              <a:lumMod val="95000"/>
-            </a:schemeClr>
-          </a:solidFill>
-        </p:spPr>
-        <p:txBody>
-          <a:bodyPr wrap="square" lIns="91440" tIns="45720" rIns="91440" bIns="45720" rtlCol="0" anchor="t">
-            <a:spAutoFit/>
-          </a:bodyPr>
-          <a:lstStyle/>
-          <a:p>
-            <a:r>
-              <a:rPr lang="en-GB" baseline="30000"/>
-              <a:t>1</a:t>
-            </a:r>
-            <a:r>
-              <a:rPr lang="en-GB" b="1">
-                <a:latin typeface="Calibri"/>
-                <a:cs typeface="Calibri"/>
-              </a:rPr>
-              <a:t>Correlation</a:t>
-            </a:r>
-            <a:r>
-              <a:rPr lang="en-GB"/>
-              <a:t> (</a:t>
-            </a:r>
-            <a:r>
-              <a:rPr lang="en-IE" sz="1800">
-                <a:effectLst/>
-                <a:latin typeface="Calibri"/>
-                <a:ea typeface="Calibri" panose="020F0502020204030204" pitchFamily="34" charset="0"/>
-                <a:cs typeface="Times New Roman"/>
-              </a:rPr>
-              <a:t>Analysis of how </a:t>
-            </a:r>
-            <a:r>
-              <a:rPr lang="en-IE" sz="1800">
-                <a:solidFill>
-                  <a:srgbClr val="FF0000"/>
-                </a:solidFill>
-                <a:effectLst/>
-                <a:latin typeface="Calibri"/>
-                <a:ea typeface="Calibri" panose="020F0502020204030204" pitchFamily="34" charset="0"/>
-                <a:cs typeface="Times New Roman"/>
-              </a:rPr>
-              <a:t>ordinal</a:t>
-            </a:r>
-            <a:r>
-              <a:rPr lang="en-IE">
-                <a:solidFill>
-                  <a:srgbClr val="FF0000"/>
-                </a:solidFill>
-                <a:latin typeface="Calibri"/>
-                <a:ea typeface="Calibri" panose="020F0502020204030204" pitchFamily="34" charset="0"/>
-                <a:cs typeface="Times New Roman"/>
-              </a:rPr>
-              <a:t>/</a:t>
-            </a:r>
-            <a:r>
-              <a:rPr lang="en-IE" sz="1800">
-                <a:solidFill>
-                  <a:srgbClr val="FF0000"/>
-                </a:solidFill>
-                <a:effectLst/>
-                <a:latin typeface="Calibri"/>
-                <a:ea typeface="Calibri" panose="020F0502020204030204" pitchFamily="34" charset="0"/>
-                <a:cs typeface="Times New Roman"/>
-              </a:rPr>
-              <a:t>interval </a:t>
-            </a:r>
-            <a:r>
-              <a:rPr lang="en-IE" sz="1800">
-                <a:solidFill>
-                  <a:srgbClr val="00B050"/>
-                </a:solidFill>
-                <a:effectLst/>
-                <a:latin typeface="Calibri"/>
-                <a:ea typeface="Calibri" panose="020F0502020204030204" pitchFamily="34" charset="0"/>
-                <a:cs typeface="Times New Roman"/>
-              </a:rPr>
-              <a:t>dependent var</a:t>
-            </a:r>
-            <a:r>
-              <a:rPr lang="en-IE" sz="1800">
-                <a:effectLst/>
-                <a:latin typeface="Calibri"/>
-                <a:ea typeface="Calibri" panose="020F0502020204030204" pitchFamily="34" charset="0"/>
-                <a:cs typeface="Times New Roman"/>
-              </a:rPr>
-              <a:t> </a:t>
-            </a:r>
-            <a:r>
-              <a:rPr lang="en-IE">
-                <a:latin typeface="Calibri"/>
-                <a:ea typeface="Calibri" panose="020F0502020204030204" pitchFamily="34" charset="0"/>
-                <a:cs typeface="Times New Roman"/>
-              </a:rPr>
-              <a:t>correlates </a:t>
-            </a:r>
-            <a:r>
-              <a:rPr lang="en-IE" sz="1800">
-                <a:effectLst/>
-                <a:latin typeface="Calibri"/>
-                <a:ea typeface="Calibri" panose="020F0502020204030204" pitchFamily="34" charset="0"/>
-                <a:cs typeface="Times New Roman"/>
-              </a:rPr>
-              <a:t>to an </a:t>
-            </a:r>
-            <a:r>
-              <a:rPr lang="en-IE" sz="1800">
-                <a:solidFill>
-                  <a:srgbClr val="FF0000"/>
-                </a:solidFill>
-                <a:effectLst/>
-                <a:latin typeface="Calibri"/>
-                <a:ea typeface="Calibri" panose="020F0502020204030204" pitchFamily="34" charset="0"/>
-                <a:cs typeface="Times New Roman"/>
-              </a:rPr>
-              <a:t>ordinal/interval </a:t>
-            </a:r>
-            <a:r>
-              <a:rPr lang="en-IE" sz="1800">
-                <a:solidFill>
-                  <a:srgbClr val="00B050"/>
-                </a:solidFill>
-                <a:effectLst/>
-                <a:latin typeface="Calibri"/>
-                <a:ea typeface="Calibri" panose="020F0502020204030204" pitchFamily="34" charset="0"/>
-                <a:cs typeface="Times New Roman"/>
-              </a:rPr>
-              <a:t>independent variable)</a:t>
-            </a:r>
-            <a:endParaRPr lang="en-GB">
-              <a:latin typeface="Calibri"/>
-              <a:cs typeface="Times New Roman"/>
-            </a:endParaRPr>
-          </a:p>
-          <a:p>
-            <a:r>
-              <a:rPr lang="en-IE" sz="1800" b="1" baseline="30000">
-                <a:effectLst/>
-                <a:latin typeface="Calibri" panose="020F0502020204030204" pitchFamily="34" charset="0"/>
-                <a:ea typeface="Calibri" panose="020F0502020204030204" pitchFamily="34" charset="0"/>
-                <a:cs typeface="Times New Roman" panose="02020603050405020304" pitchFamily="18" charset="0"/>
-              </a:rPr>
-              <a:t>2</a:t>
-            </a:r>
-            <a:r>
-              <a:rPr lang="en-IE" sz="1800" b="1">
-                <a:effectLst/>
-                <a:latin typeface="Calibri" panose="020F0502020204030204" pitchFamily="34" charset="0"/>
-                <a:ea typeface="Calibri" panose="020F0502020204030204" pitchFamily="34" charset="0"/>
-                <a:cs typeface="Times New Roman" panose="02020603050405020304" pitchFamily="18" charset="0"/>
-              </a:rPr>
-              <a:t>Comparison of means</a:t>
-            </a:r>
-            <a:r>
-              <a:rPr lang="en-IE" sz="1800">
-                <a:effectLst/>
-                <a:latin typeface="Calibri" panose="020F0502020204030204" pitchFamily="34" charset="0"/>
-                <a:ea typeface="Calibri" panose="020F0502020204030204" pitchFamily="34" charset="0"/>
-                <a:cs typeface="Times New Roman" panose="02020603050405020304" pitchFamily="18" charset="0"/>
-              </a:rPr>
-              <a:t> (or medians): Analysis of the difference between the mean (or median) value of a characteristic shared by members of two different populations.</a:t>
-            </a:r>
-          </a:p>
-          <a:p>
-            <a:r>
-              <a:rPr lang="en-IE" sz="1800" b="1" baseline="30000">
-                <a:effectLst/>
-                <a:latin typeface="Calibri" panose="020F0502020204030204" pitchFamily="34" charset="0"/>
-                <a:ea typeface="Calibri" panose="020F0502020204030204" pitchFamily="34" charset="0"/>
-                <a:cs typeface="Times New Roman" panose="02020603050405020304" pitchFamily="18" charset="0"/>
-              </a:rPr>
-              <a:t>3</a:t>
-            </a:r>
-            <a:r>
-              <a:rPr lang="en-IE" sz="1800" b="1">
-                <a:effectLst/>
-                <a:latin typeface="Calibri" panose="020F0502020204030204" pitchFamily="34" charset="0"/>
-                <a:ea typeface="Calibri" panose="020F0502020204030204" pitchFamily="34" charset="0"/>
-                <a:cs typeface="Times New Roman" panose="02020603050405020304" pitchFamily="18" charset="0"/>
-              </a:rPr>
-              <a:t>Comparison of proportions:</a:t>
-            </a:r>
-            <a:r>
-              <a:rPr lang="en-IE" sz="1800">
-                <a:effectLst/>
-                <a:latin typeface="Calibri" panose="020F0502020204030204" pitchFamily="34" charset="0"/>
-                <a:ea typeface="Calibri" panose="020F0502020204030204" pitchFamily="34" charset="0"/>
-                <a:cs typeface="Times New Roman" panose="02020603050405020304" pitchFamily="18" charset="0"/>
-              </a:rPr>
-              <a:t> Analysis of the difference in proportions of a characteristic shared by members of two different populations. </a:t>
-            </a:r>
-            <a:endParaRPr lang="en-GB"/>
-          </a:p>
-        </p:txBody>
-      </p:sp>
-    </p:spTree>
-    <p:extLst>
-      <p:ext uri="{BB962C8B-B14F-4D97-AF65-F5344CB8AC3E}">
-        <p14:creationId xmlns:p14="http://schemas.microsoft.com/office/powerpoint/2010/main" val="32494612"/>
-      </p:ext>
-    </p:extLst>
-  </p:cSld>
-  <p:clrMapOvr>
-    <a:masterClrMapping/>
-  </p:clrMapOvr>
-</p:sld>
-</file>
-
-<file path=ppt/slides/slide5.xml><?xml version="1.0" encoding="utf-8"?>
-<p:sld xmlns:a="http://schemas.openxmlformats.org/drawingml/2006/main" xmlns:r="http://schemas.openxmlformats.org/officeDocument/2006/relationships" xmlns:p="http://schemas.openxmlformats.org/presentationml/2006/main">
-  <p:cSld>
-    <p:spTree>
-      <p:nvGrpSpPr>
-        <p:cNvPr id="1" name=""/>
-        <p:cNvGrpSpPr/>
-        <p:nvPr/>
-      </p:nvGrpSpPr>
-      <p:grpSpPr>
-        <a:xfrm>
-          <a:off x="0" y="0"/>
-          <a:ext cx="0" cy="0"/>
-          <a:chOff x="0" y="0"/>
-          <a:chExt cx="0" cy="0"/>
-        </a:xfrm>
-      </p:grpSpPr>
-      <p:sp>
-        <p:nvSpPr>
-          <p:cNvPr id="2" name="Subtitle 1">
-            <a:extLst>
-              <a:ext uri="{FF2B5EF4-FFF2-40B4-BE49-F238E27FC236}">
-                <a16:creationId xmlns:a16="http://schemas.microsoft.com/office/drawing/2014/main" id="{6B64221B-D6D4-E382-A91A-99FF908D5475}"/>
-              </a:ext>
-            </a:extLst>
-          </p:cNvPr>
-          <p:cNvSpPr>
-            <a:spLocks noGrp="1"/>
-          </p:cNvSpPr>
-          <p:nvPr>
-            <p:ph type="subTitle" idx="1"/>
-          </p:nvPr>
-        </p:nvSpPr>
-        <p:spPr>
-          <a:xfrm>
-            <a:off x="521219" y="284375"/>
-            <a:ext cx="10406581" cy="1391600"/>
-          </a:xfrm>
-        </p:spPr>
-        <p:txBody>
-          <a:bodyPr vert="horz" lIns="0" tIns="0" rIns="0" bIns="0" rtlCol="0" anchor="t">
-            <a:noAutofit/>
-          </a:bodyPr>
-          <a:lstStyle/>
-          <a:p>
-            <a:pPr>
-              <a:lnSpc>
-                <a:spcPct val="100000"/>
-              </a:lnSpc>
-            </a:pPr>
-            <a:r>
-              <a:rPr lang="en-GB" sz="2400" b="0" dirty="0">
-                <a:latin typeface="Calibri"/>
-                <a:cs typeface="Calibri"/>
-              </a:rPr>
-              <a:t>Add your </a:t>
-            </a:r>
-            <a:r>
-              <a:rPr lang="en-GB" sz="2400" dirty="0">
-                <a:latin typeface="Calibri"/>
-                <a:cs typeface="Calibri"/>
-              </a:rPr>
-              <a:t>Hypotheses</a:t>
-            </a:r>
-            <a:r>
-              <a:rPr lang="en-GB" sz="2400" b="0" dirty="0">
-                <a:latin typeface="Calibri"/>
-                <a:cs typeface="Calibri"/>
-              </a:rPr>
-              <a:t> to the previous RQ Slide  (both the Null and Alternative Hypotheses).  Here are definitions and examples. </a:t>
-            </a:r>
-            <a:r>
-              <a:rPr lang="en-GB" sz="2400">
-                <a:latin typeface="Calibri"/>
-                <a:cs typeface="Calibri"/>
-              </a:rPr>
-              <a:t>Your hypothesis wording comes directly from your </a:t>
-            </a:r>
-            <a:r>
-              <a:rPr lang="en-GB" sz="2400" dirty="0">
-                <a:latin typeface="Calibri"/>
-                <a:cs typeface="Calibri"/>
-              </a:rPr>
-              <a:t>RQ</a:t>
-            </a:r>
-            <a:r>
-              <a:rPr lang="en-GB" sz="2400" b="0" dirty="0">
-                <a:latin typeface="Calibri"/>
-                <a:cs typeface="Calibri"/>
-              </a:rPr>
-              <a:t>. This is the formal way of reporting the results of your inferential test statistics,  in which we report the </a:t>
-            </a:r>
-            <a:r>
-              <a:rPr lang="en-GB" sz="2400" b="0" i="1" dirty="0">
-                <a:latin typeface="Calibri"/>
-                <a:cs typeface="Calibri"/>
-              </a:rPr>
-              <a:t>effect</a:t>
-            </a:r>
-            <a:r>
-              <a:rPr lang="en-GB" sz="2400" b="0" dirty="0">
-                <a:latin typeface="Calibri"/>
-                <a:cs typeface="Calibri"/>
-              </a:rPr>
-              <a:t> the independent variable has on the dependent variable – </a:t>
-            </a:r>
-          </a:p>
-          <a:p>
-            <a:pPr marL="457200" indent="-457200">
-              <a:lnSpc>
-                <a:spcPct val="100000"/>
-              </a:lnSpc>
-              <a:buAutoNum type="arabicPeriod"/>
-            </a:pPr>
-            <a:r>
-              <a:rPr lang="en-GB" sz="2000" b="0">
-                <a:latin typeface="Arial"/>
-                <a:cs typeface="Arial"/>
-              </a:rPr>
-              <a:t>Null hypothesis (H</a:t>
-            </a:r>
-            <a:r>
-              <a:rPr lang="en-GB" sz="2000" b="0" baseline="-25000">
-                <a:latin typeface="Arial"/>
-                <a:cs typeface="Arial"/>
-              </a:rPr>
-              <a:t>0</a:t>
-            </a:r>
-            <a:r>
-              <a:rPr lang="en-GB" sz="2000" b="0">
-                <a:latin typeface="Arial"/>
-                <a:cs typeface="Arial"/>
-              </a:rPr>
-              <a:t>): There is </a:t>
-            </a:r>
-            <a:r>
-              <a:rPr lang="en-GB" sz="2000">
-                <a:latin typeface="Arial"/>
-                <a:cs typeface="Arial"/>
-              </a:rPr>
-              <a:t>no </a:t>
-            </a:r>
-            <a:r>
-              <a:rPr lang="en-GB" sz="2000" b="0">
-                <a:latin typeface="Arial"/>
-                <a:cs typeface="Arial"/>
-              </a:rPr>
-              <a:t>effect on the population – so you write one of the following:  </a:t>
-            </a:r>
-          </a:p>
-          <a:p>
-            <a:pPr>
-              <a:lnSpc>
-                <a:spcPct val="100000"/>
-              </a:lnSpc>
-            </a:pPr>
-            <a:r>
-              <a:rPr lang="en-GB" sz="2000" b="0">
-                <a:solidFill>
-                  <a:srgbClr val="FF0000"/>
-                </a:solidFill>
-                <a:latin typeface="Arial"/>
-                <a:cs typeface="Arial"/>
-              </a:rPr>
-              <a:t>Null hypothesis (H</a:t>
-            </a:r>
-            <a:r>
-              <a:rPr lang="en-GB" sz="2000" b="0" baseline="-25000">
-                <a:solidFill>
-                  <a:srgbClr val="FF0000"/>
-                </a:solidFill>
-                <a:latin typeface="Arial"/>
-                <a:cs typeface="Arial"/>
-              </a:rPr>
-              <a:t>0</a:t>
-            </a:r>
-            <a:r>
-              <a:rPr lang="en-GB" sz="2000" b="0">
-                <a:solidFill>
-                  <a:srgbClr val="FF0000"/>
-                </a:solidFill>
-                <a:latin typeface="Arial"/>
-                <a:cs typeface="Arial"/>
-              </a:rPr>
-              <a:t>): There is </a:t>
-            </a:r>
-            <a:r>
-              <a:rPr lang="en-GB" sz="2000">
-                <a:solidFill>
-                  <a:srgbClr val="FF0000"/>
-                </a:solidFill>
-                <a:latin typeface="Arial"/>
-                <a:cs typeface="Arial"/>
-              </a:rPr>
-              <a:t>no</a:t>
-            </a:r>
-            <a:r>
-              <a:rPr lang="en-GB" sz="2000" b="0">
-                <a:solidFill>
-                  <a:srgbClr val="FF0000"/>
-                </a:solidFill>
-                <a:latin typeface="Arial"/>
-                <a:cs typeface="Arial"/>
-              </a:rPr>
-              <a:t> difference in the mean/median of the [dependent variable] between/among [subsets of the independent variable].              </a:t>
-            </a:r>
-            <a:r>
-              <a:rPr lang="en-GB" sz="2000" b="0">
-                <a:solidFill>
-                  <a:schemeClr val="tx1"/>
-                </a:solidFill>
-                <a:latin typeface="Arial"/>
-                <a:cs typeface="Arial"/>
-              </a:rPr>
-              <a:t>or</a:t>
-            </a:r>
-          </a:p>
-          <a:p>
-            <a:pPr>
-              <a:lnSpc>
-                <a:spcPct val="100000"/>
-              </a:lnSpc>
-            </a:pPr>
-            <a:r>
-              <a:rPr lang="en-GB" sz="2000" b="0">
-                <a:solidFill>
-                  <a:srgbClr val="FF0000"/>
-                </a:solidFill>
-                <a:latin typeface="Arial"/>
-                <a:cs typeface="Arial"/>
-              </a:rPr>
-              <a:t>Null hypothesis (H</a:t>
-            </a:r>
-            <a:r>
-              <a:rPr lang="en-GB" sz="2000" b="0" baseline="-25000">
-                <a:solidFill>
-                  <a:srgbClr val="FF0000"/>
-                </a:solidFill>
-                <a:latin typeface="Arial"/>
-                <a:cs typeface="Arial"/>
-              </a:rPr>
-              <a:t>0</a:t>
-            </a:r>
-            <a:r>
-              <a:rPr lang="en-GB" sz="2000" b="0">
-                <a:solidFill>
-                  <a:srgbClr val="FF0000"/>
-                </a:solidFill>
-                <a:latin typeface="Arial"/>
-                <a:cs typeface="Arial"/>
-              </a:rPr>
-              <a:t>):  There is </a:t>
-            </a:r>
-            <a:r>
-              <a:rPr lang="en-GB" sz="2000">
-                <a:solidFill>
-                  <a:srgbClr val="FF0000"/>
-                </a:solidFill>
-                <a:latin typeface="Arial"/>
-                <a:cs typeface="Arial"/>
-              </a:rPr>
-              <a:t>no</a:t>
-            </a:r>
-            <a:r>
-              <a:rPr lang="en-GB" sz="2000" b="0">
-                <a:solidFill>
-                  <a:srgbClr val="FF0000"/>
-                </a:solidFill>
-                <a:latin typeface="Arial"/>
-                <a:cs typeface="Arial"/>
-              </a:rPr>
-              <a:t> difference in the proportions(s)of [subset(s) of dependent variable] between/among [subsets of independent variable].                     </a:t>
-            </a:r>
-            <a:r>
-              <a:rPr lang="en-GB" sz="2000" b="0">
-                <a:solidFill>
-                  <a:schemeClr val="tx1"/>
-                </a:solidFill>
-                <a:latin typeface="Arial"/>
-                <a:cs typeface="Arial"/>
-              </a:rPr>
-              <a:t>or</a:t>
-            </a:r>
-          </a:p>
-          <a:p>
-            <a:pPr>
-              <a:lnSpc>
-                <a:spcPct val="100000"/>
-              </a:lnSpc>
-            </a:pPr>
-            <a:r>
-              <a:rPr lang="en-GB" sz="2000" b="0">
-                <a:solidFill>
-                  <a:srgbClr val="FF0000"/>
-                </a:solidFill>
-                <a:latin typeface="Arial"/>
-                <a:cs typeface="Arial"/>
-              </a:rPr>
-              <a:t>Null hypothesis (H</a:t>
-            </a:r>
-            <a:r>
-              <a:rPr lang="en-GB" sz="2000" b="0" baseline="-25000">
-                <a:solidFill>
-                  <a:srgbClr val="FF0000"/>
-                </a:solidFill>
-                <a:latin typeface="Arial"/>
-                <a:cs typeface="Arial"/>
-              </a:rPr>
-              <a:t>0</a:t>
-            </a:r>
-            <a:r>
-              <a:rPr lang="en-GB" sz="2000" b="0">
-                <a:solidFill>
-                  <a:srgbClr val="FF0000"/>
-                </a:solidFill>
-                <a:latin typeface="Arial"/>
-                <a:cs typeface="Arial"/>
-              </a:rPr>
-              <a:t>): There is </a:t>
-            </a:r>
-            <a:r>
-              <a:rPr lang="en-GB" sz="2000">
-                <a:solidFill>
-                  <a:srgbClr val="FF0000"/>
-                </a:solidFill>
-                <a:latin typeface="Arial"/>
-                <a:cs typeface="Arial"/>
-              </a:rPr>
-              <a:t>no</a:t>
-            </a:r>
-            <a:r>
-              <a:rPr lang="en-GB" sz="2000" b="0">
-                <a:solidFill>
-                  <a:srgbClr val="FF0000"/>
-                </a:solidFill>
-                <a:latin typeface="Arial"/>
-                <a:cs typeface="Arial"/>
-              </a:rPr>
-              <a:t> correlation between [dependent variable] and [independent variable].</a:t>
-            </a:r>
-          </a:p>
-          <a:p>
-            <a:pPr>
-              <a:lnSpc>
-                <a:spcPct val="100000"/>
-              </a:lnSpc>
-            </a:pPr>
-            <a:r>
-              <a:rPr lang="en-GB" sz="2000" b="0">
-                <a:latin typeface="Arial"/>
-                <a:cs typeface="Arial"/>
-              </a:rPr>
-              <a:t>2. Alternative hypothesis (H</a:t>
-            </a:r>
-            <a:r>
-              <a:rPr lang="en-GB" sz="2000" b="0" baseline="-25000">
-                <a:latin typeface="Arial"/>
-                <a:cs typeface="Arial"/>
-              </a:rPr>
-              <a:t>1</a:t>
-            </a:r>
-            <a:r>
-              <a:rPr lang="en-GB" sz="2000" b="0">
-                <a:latin typeface="Arial"/>
-                <a:cs typeface="Arial"/>
-              </a:rPr>
-              <a:t>):  There appears to be an effect on the population – so you copy what you wrote for the Null hypothesis but remove the ‘no’ and replace with ‘</a:t>
-            </a:r>
-            <a:r>
-              <a:rPr lang="en-GB" sz="2000">
-                <a:latin typeface="Arial"/>
-                <a:cs typeface="Arial"/>
-              </a:rPr>
-              <a:t>a’  </a:t>
-            </a:r>
-            <a:r>
-              <a:rPr lang="en-GB" sz="2000" b="0">
-                <a:latin typeface="Arial"/>
-                <a:cs typeface="Arial"/>
-              </a:rPr>
-              <a:t>For example:</a:t>
-            </a:r>
-          </a:p>
-          <a:p>
-            <a:pPr>
-              <a:lnSpc>
-                <a:spcPct val="100000"/>
-              </a:lnSpc>
-            </a:pPr>
-            <a:r>
-              <a:rPr lang="en-GB" sz="2000" b="0">
-                <a:solidFill>
-                  <a:srgbClr val="FF0000"/>
-                </a:solidFill>
-                <a:latin typeface="Arial"/>
-                <a:cs typeface="Arial"/>
-              </a:rPr>
-              <a:t>Alt hypothesis (H</a:t>
-            </a:r>
-            <a:r>
-              <a:rPr lang="en-GB" sz="2000" b="0" baseline="-25000">
-                <a:solidFill>
-                  <a:srgbClr val="FF0000"/>
-                </a:solidFill>
-                <a:latin typeface="Arial"/>
-                <a:cs typeface="Arial"/>
-              </a:rPr>
-              <a:t>1</a:t>
-            </a:r>
-            <a:r>
-              <a:rPr lang="en-GB" sz="2000" b="0">
-                <a:solidFill>
-                  <a:srgbClr val="FF0000"/>
-                </a:solidFill>
-                <a:latin typeface="Arial"/>
-                <a:cs typeface="Arial"/>
-              </a:rPr>
-              <a:t>): There is </a:t>
-            </a:r>
-            <a:r>
-              <a:rPr lang="en-GB" sz="2000">
-                <a:solidFill>
-                  <a:srgbClr val="FF0000"/>
-                </a:solidFill>
-                <a:latin typeface="Arial"/>
-                <a:cs typeface="Arial"/>
-              </a:rPr>
-              <a:t>a</a:t>
-            </a:r>
-            <a:r>
-              <a:rPr lang="en-GB" sz="2000" b="0">
-                <a:solidFill>
-                  <a:srgbClr val="FF0000"/>
-                </a:solidFill>
-                <a:latin typeface="Arial"/>
-                <a:cs typeface="Arial"/>
-              </a:rPr>
-              <a:t> correlation between [dependent variable] and [independent variable].</a:t>
-            </a:r>
-          </a:p>
-        </p:txBody>
-      </p:sp>
-      <p:sp>
-        <p:nvSpPr>
-          <p:cNvPr id="4" name="Slide Number Placeholder 3">
-            <a:extLst>
-              <a:ext uri="{FF2B5EF4-FFF2-40B4-BE49-F238E27FC236}">
-                <a16:creationId xmlns:a16="http://schemas.microsoft.com/office/drawing/2014/main" id="{FF7EDF94-2B89-A21D-BBC0-E455C2D9893B}"/>
-              </a:ext>
-            </a:extLst>
-          </p:cNvPr>
-          <p:cNvSpPr>
-            <a:spLocks noGrp="1"/>
-          </p:cNvSpPr>
-          <p:nvPr>
-            <p:ph type="sldNum" sz="quarter" idx="12"/>
-          </p:nvPr>
-        </p:nvSpPr>
-        <p:spPr>
-          <a:xfrm>
-            <a:off x="11269543" y="284375"/>
-            <a:ext cx="558281" cy="221244"/>
-          </a:xfrm>
-        </p:spPr>
-        <p:txBody>
-          <a:bodyPr/>
-          <a:lstStyle/>
-          <a:p>
-            <a:r>
-              <a:rPr lang="en-US"/>
-              <a:t>4</a:t>
-            </a:r>
-            <a:endParaRPr lang="en-GB"/>
-          </a:p>
-        </p:txBody>
-      </p:sp>
-      <p:sp>
-        <p:nvSpPr>
-          <p:cNvPr id="6" name="TextBox 5">
-            <a:extLst>
-              <a:ext uri="{FF2B5EF4-FFF2-40B4-BE49-F238E27FC236}">
-                <a16:creationId xmlns:a16="http://schemas.microsoft.com/office/drawing/2014/main" id="{1841CE34-1B2E-88D5-0C3F-506E8C37BB7B}"/>
-              </a:ext>
-            </a:extLst>
-          </p:cNvPr>
-          <p:cNvSpPr txBox="1"/>
-          <p:nvPr/>
-        </p:nvSpPr>
-        <p:spPr>
-          <a:xfrm>
-            <a:off x="3356146" y="5298491"/>
-            <a:ext cx="7811780" cy="1477328"/>
+            <a:off x="965288" y="3606172"/>
+            <a:ext cx="9123010" cy="1554272"/>
           </a:xfrm>
           <a:prstGeom prst="rect">
             <a:avLst/>
           </a:prstGeom>
           <a:noFill/>
+          <a:ln>
+            <a:noFill/>
+          </a:ln>
+          <a:effectLst/>
+          <a:extLst>
+            <a:ext uri="{909E8E84-426E-40DD-AFC4-6F175D3DCCD1}">
+              <a14:hiddenFill xmlns:a14="http://schemas.microsoft.com/office/drawing/2010/main">
+                <a:solidFill>
+                  <a:schemeClr val="accent1"/>
+                </a:solidFill>
+              </a14:hiddenFill>
+            </a:ext>
+            <a:ext uri="{91240B29-F687-4F45-9708-019B960494DF}">
+              <a14:hiddenLine xmlns:a14="http://schemas.microsoft.com/office/drawing/2010/main" w="9525">
+                <a:solidFill>
+                  <a:schemeClr val="tx1"/>
+                </a:solidFill>
+                <a:miter lim="800000"/>
+                <a:headEnd/>
+                <a:tailEnd/>
+              </a14:hiddenLine>
+            </a:ext>
+            <a:ext uri="{AF507438-7753-43E0-B8FC-AC1667EBCBE1}">
+              <a14:hiddenEffects xmlns:a14="http://schemas.microsoft.com/office/drawing/2010/main">
+                <a:effectLst>
+                  <a:outerShdw dist="35921" dir="2700000" algn="ctr" rotWithShape="0">
+                    <a:schemeClr val="bg2"/>
+                  </a:outerShdw>
+                </a:effectLst>
+              </a14:hiddenEffects>
+            </a:ext>
+          </a:extLst>
         </p:spPr>
         <p:txBody>
-          <a:bodyPr wrap="square" lIns="91440" tIns="45720" rIns="91440" bIns="45720" anchor="t">
+          <a:bodyPr vert="horz" wrap="none" lIns="91440" tIns="45720" rIns="91440" bIns="45720" numCol="1" anchor="ctr" anchorCtr="0" compatLnSpc="1">
+            <a:prstTxWarp prst="textNoShape">
+              <a:avLst/>
+            </a:prstTxWarp>
             <a:spAutoFit/>
           </a:bodyPr>
           <a:lstStyle/>
           <a:p>
-            <a:r>
-              <a:rPr lang="en-GB"/>
-              <a:t>L</a:t>
-            </a:r>
-            <a:r>
-              <a:rPr lang="en-GB" sz="1800" b="0"/>
-              <a:t>eave the hypotheses as </a:t>
-            </a:r>
-            <a:r>
-              <a:rPr lang="en-GB"/>
-              <a:t>two </a:t>
-            </a:r>
-            <a:r>
-              <a:rPr lang="en-GB" sz="1800" b="0"/>
-              <a:t>statements for now – after your </a:t>
-            </a:r>
-            <a:r>
-              <a:rPr lang="en-GB"/>
-              <a:t>statistical </a:t>
-            </a:r>
-            <a:r>
-              <a:rPr lang="en-GB" sz="1800" b="0"/>
-              <a:t>analysis </a:t>
-            </a:r>
-            <a:r>
-              <a:rPr lang="en-GB"/>
-              <a:t>test, </a:t>
-            </a:r>
-            <a:r>
-              <a:rPr lang="en-GB" sz="1800" b="0"/>
-              <a:t>you </a:t>
-            </a:r>
-            <a:r>
-              <a:rPr lang="en-GB"/>
-              <a:t>will </a:t>
-            </a:r>
-            <a:r>
-              <a:rPr lang="en-GB" sz="1800" b="0"/>
-              <a:t>choose one or the other.</a:t>
-            </a:r>
-            <a:r>
-              <a:rPr lang="en-GB"/>
-              <a:t> (</a:t>
-            </a:r>
-            <a:r>
-              <a:rPr lang="en-GB" i="1"/>
-              <a:t>You will report: "We fail to reject the null hypothesis" with no significant result, or if you do have significance [p-value = &lt; 0.05] you can state "We reject the null hypothesis".   More guidance on hypothesis testing is given in the lectures</a:t>
-            </a:r>
-            <a:r>
-              <a:rPr lang="en-GB"/>
-              <a:t>.)</a:t>
-            </a:r>
-            <a:endParaRPr lang="en-GB">
-              <a:cs typeface="Arial"/>
+            <a:pPr marL="0" marR="0" lvl="0" indent="0" algn="l" defTabSz="914400" rtl="0" eaLnBrk="0" fontAlgn="base" latinLnBrk="0" hangingPunct="0">
+              <a:lnSpc>
+                <a:spcPct val="100000"/>
+              </a:lnSpc>
+              <a:spcBef>
+                <a:spcPts val="130"/>
+              </a:spcBef>
+              <a:spcAft>
+                <a:spcPts val="130"/>
+              </a:spcAft>
+              <a:buClrTx/>
+              <a:buSzTx/>
+              <a:tabLst/>
+            </a:pPr>
+            <a:r>
+              <a:rPr kumimoji="0" lang="en-US" altLang="en-US" sz="1800" i="0" u="none" strike="noStrike" cap="none" normalizeH="0" baseline="0">
+                <a:ln>
+                  <a:noFill/>
+                </a:ln>
+                <a:solidFill>
+                  <a:srgbClr val="000000"/>
+                </a:solidFill>
+                <a:effectLst/>
+                <a:latin typeface="Arial" panose="020B0604020202020204" pitchFamily="34" charset="0"/>
+              </a:rPr>
+              <a:t>Null hypothesis (H</a:t>
+            </a:r>
+            <a:r>
+              <a:rPr kumimoji="0" lang="en-US" altLang="en-US" sz="1800" i="0" u="none" strike="noStrike" cap="none" normalizeH="0" baseline="-25000">
+                <a:ln>
+                  <a:noFill/>
+                </a:ln>
+                <a:solidFill>
+                  <a:srgbClr val="000000"/>
+                </a:solidFill>
+                <a:effectLst/>
+                <a:latin typeface="Arial" panose="020B0604020202020204" pitchFamily="34" charset="0"/>
+              </a:rPr>
+              <a:t>0</a:t>
+            </a:r>
+            <a:r>
+              <a:rPr kumimoji="0" lang="en-US" altLang="en-US" sz="1800" i="0" u="none" strike="noStrike" cap="none" normalizeH="0" baseline="0">
+                <a:ln>
+                  <a:noFill/>
+                </a:ln>
+                <a:solidFill>
+                  <a:srgbClr val="000000"/>
+                </a:solidFill>
+                <a:effectLst/>
+                <a:latin typeface="Arial" panose="020B0604020202020204" pitchFamily="34" charset="0"/>
+              </a:rPr>
+              <a:t>​): </a:t>
+            </a:r>
+          </a:p>
+          <a:p>
+            <a:pPr marL="0" marR="0" lvl="0" indent="0" algn="l" defTabSz="914400" rtl="0" eaLnBrk="0" fontAlgn="base" latinLnBrk="0" hangingPunct="0">
+              <a:lnSpc>
+                <a:spcPct val="100000"/>
+              </a:lnSpc>
+              <a:spcBef>
+                <a:spcPts val="130"/>
+              </a:spcBef>
+              <a:spcAft>
+                <a:spcPts val="130"/>
+              </a:spcAft>
+              <a:buClrTx/>
+              <a:buSzTx/>
+              <a:tabLst/>
+            </a:pPr>
+            <a:r>
+              <a:rPr kumimoji="0" lang="en-US" altLang="en-US" sz="1800" b="0" i="0" u="none" strike="noStrike" cap="none" normalizeH="0" baseline="0">
+                <a:ln>
+                  <a:noFill/>
+                </a:ln>
+                <a:solidFill>
+                  <a:srgbClr val="000000"/>
+                </a:solidFill>
+                <a:effectLst/>
+                <a:latin typeface="Arial" panose="020B0604020202020204" pitchFamily="34" charset="0"/>
+              </a:rPr>
+              <a:t>There is </a:t>
+            </a:r>
+            <a:r>
+              <a:rPr kumimoji="0" lang="en-US" altLang="en-US" sz="1800" b="1" i="0" u="none" strike="noStrike" cap="none" normalizeH="0" baseline="0">
+                <a:ln>
+                  <a:noFill/>
+                </a:ln>
+                <a:solidFill>
+                  <a:srgbClr val="000000"/>
+                </a:solidFill>
+                <a:effectLst/>
+                <a:latin typeface="Arial" panose="020B0604020202020204" pitchFamily="34" charset="0"/>
+              </a:rPr>
+              <a:t>no difference</a:t>
+            </a:r>
+            <a:r>
+              <a:rPr kumimoji="0" lang="en-US" altLang="en-US" sz="1800" b="0" i="0" u="none" strike="noStrike" cap="none" normalizeH="0" baseline="0">
+                <a:ln>
+                  <a:noFill/>
+                </a:ln>
+                <a:solidFill>
+                  <a:srgbClr val="000000"/>
+                </a:solidFill>
+                <a:effectLst/>
+                <a:latin typeface="Arial" panose="020B0604020202020204" pitchFamily="34" charset="0"/>
+              </a:rPr>
+              <a:t> in the mean of daily precipitation among the seasons in London.</a:t>
+            </a:r>
+          </a:p>
+          <a:p>
+            <a:pPr marL="0" marR="0" lvl="0" indent="0" algn="l" defTabSz="914400" rtl="0" eaLnBrk="0" fontAlgn="base" latinLnBrk="0" hangingPunct="0">
+              <a:lnSpc>
+                <a:spcPct val="100000"/>
+              </a:lnSpc>
+              <a:spcBef>
+                <a:spcPts val="130"/>
+              </a:spcBef>
+              <a:spcAft>
+                <a:spcPts val="130"/>
+              </a:spcAft>
+              <a:buClrTx/>
+              <a:buSzTx/>
+              <a:tabLst/>
+            </a:pPr>
+            <a:br>
+              <a:rPr kumimoji="0" lang="en-US" altLang="en-US" sz="1800" i="0" u="none" strike="noStrike" cap="none" normalizeH="0" baseline="0">
+                <a:ln>
+                  <a:noFill/>
+                </a:ln>
+                <a:solidFill>
+                  <a:srgbClr val="000000"/>
+                </a:solidFill>
+                <a:effectLst/>
+                <a:latin typeface="Arial" panose="020B0604020202020204" pitchFamily="34" charset="0"/>
+              </a:rPr>
+            </a:br>
+            <a:r>
+              <a:rPr kumimoji="0" lang="en-US" altLang="en-US" sz="1800" i="0" u="none" strike="noStrike" cap="none" normalizeH="0" baseline="0">
+                <a:ln>
+                  <a:noFill/>
+                </a:ln>
+                <a:solidFill>
+                  <a:srgbClr val="000000"/>
+                </a:solidFill>
+                <a:effectLst/>
+                <a:latin typeface="Arial" panose="020B0604020202020204" pitchFamily="34" charset="0"/>
+              </a:rPr>
+              <a:t>Alternative hypothesis (H</a:t>
+            </a:r>
+            <a:r>
+              <a:rPr kumimoji="0" lang="en-US" altLang="en-US" sz="1800" i="0" u="none" strike="noStrike" cap="none" normalizeH="0" baseline="-25000">
+                <a:ln>
+                  <a:noFill/>
+                </a:ln>
+                <a:solidFill>
+                  <a:srgbClr val="000000"/>
+                </a:solidFill>
+                <a:effectLst/>
+                <a:latin typeface="Arial" panose="020B0604020202020204" pitchFamily="34" charset="0"/>
+              </a:rPr>
+              <a:t>1</a:t>
+            </a:r>
+            <a:r>
+              <a:rPr kumimoji="0" lang="en-US" altLang="en-US" sz="1800" i="0" u="none" strike="noStrike" cap="none" normalizeH="0" baseline="0">
+                <a:ln>
+                  <a:noFill/>
+                </a:ln>
+                <a:solidFill>
+                  <a:srgbClr val="000000"/>
+                </a:solidFill>
+                <a:effectLst/>
+                <a:latin typeface="Arial" panose="020B0604020202020204" pitchFamily="34" charset="0"/>
+              </a:rPr>
+              <a:t>​): </a:t>
+            </a:r>
+          </a:p>
+          <a:p>
+            <a:pPr marL="0" marR="0" lvl="0" indent="0" algn="l" defTabSz="914400" rtl="0" eaLnBrk="0" fontAlgn="base" latinLnBrk="0" hangingPunct="0">
+              <a:lnSpc>
+                <a:spcPct val="100000"/>
+              </a:lnSpc>
+              <a:spcBef>
+                <a:spcPts val="130"/>
+              </a:spcBef>
+              <a:spcAft>
+                <a:spcPts val="130"/>
+              </a:spcAft>
+              <a:buClrTx/>
+              <a:buSzTx/>
+              <a:tabLst/>
+            </a:pPr>
+            <a:r>
+              <a:rPr kumimoji="0" lang="en-US" altLang="en-US" sz="1800" b="0" i="0" u="none" strike="noStrike" cap="none" normalizeH="0" baseline="0">
+                <a:ln>
+                  <a:noFill/>
+                </a:ln>
+                <a:solidFill>
+                  <a:srgbClr val="000000"/>
+                </a:solidFill>
+                <a:effectLst/>
+                <a:latin typeface="Arial" panose="020B0604020202020204" pitchFamily="34" charset="0"/>
+              </a:rPr>
+              <a:t>There is </a:t>
+            </a:r>
+            <a:r>
+              <a:rPr kumimoji="0" lang="en-US" altLang="en-US" sz="1800" b="1" i="0" u="none" strike="noStrike" cap="none" normalizeH="0" baseline="0">
+                <a:ln>
+                  <a:noFill/>
+                </a:ln>
+                <a:solidFill>
+                  <a:srgbClr val="000000"/>
+                </a:solidFill>
+                <a:effectLst/>
+                <a:latin typeface="Arial" panose="020B0604020202020204" pitchFamily="34" charset="0"/>
+              </a:rPr>
+              <a:t>a difference </a:t>
+            </a:r>
+            <a:r>
+              <a:rPr kumimoji="0" lang="en-US" altLang="en-US" sz="1800" b="0" i="0" u="none" strike="noStrike" cap="none" normalizeH="0" baseline="0">
+                <a:ln>
+                  <a:noFill/>
+                </a:ln>
+                <a:solidFill>
+                  <a:srgbClr val="000000"/>
+                </a:solidFill>
+                <a:effectLst/>
+                <a:latin typeface="Arial" panose="020B0604020202020204" pitchFamily="34" charset="0"/>
+              </a:rPr>
+              <a:t>in the mean of daily precipitation among the seasons in London.</a:t>
+            </a:r>
+            <a:endParaRPr kumimoji="0" lang="en-US" altLang="en-US" sz="1800" b="0" i="0" u="none" strike="noStrike" cap="none" normalizeH="0" baseline="0">
+              <a:ln>
+                <a:noFill/>
+              </a:ln>
+              <a:solidFill>
+                <a:schemeClr val="tx1"/>
+              </a:solidFill>
+              <a:effectLst/>
+              <a:latin typeface="Arial" panose="020B0604020202020204" pitchFamily="34" charset="0"/>
             </a:endParaRPr>
           </a:p>
         </p:txBody>
@@ -7033,7 +6264,7 @@
     </p:spTree>
     <p:extLst>
       <p:ext uri="{BB962C8B-B14F-4D97-AF65-F5344CB8AC3E}">
-        <p14:creationId xmlns:p14="http://schemas.microsoft.com/office/powerpoint/2010/main" val="2952338475"/>
+        <p14:creationId xmlns:p14="http://schemas.microsoft.com/office/powerpoint/2010/main" val="32494612"/>
       </p:ext>
     </p:extLst>
   </p:cSld>

</xml_diff>

<commit_message>
feat: Project Question updated with the Professors advices
</commit_message>
<xml_diff>
--- a/reseach_question_presentation_template.pptx
+++ b/reseach_question_presentation_template.pptx
@@ -254,7 +254,7 @@
             <a:fld id="{93FAAC3A-BD1F-4A00-9099-74B95789FE00}" type="datetimeFigureOut">
               <a:rPr lang="en-GB" smtClean="0"/>
               <a:pPr/>
-              <a:t>19/11/2025</a:t>
+              <a:t>23/11/2025</a:t>
             </a:fld>
             <a:endParaRPr lang="en-GB"/>
           </a:p>
@@ -433,7 +433,7 @@
             <a:fld id="{8E359C8A-39F6-4045-9163-4042C4C26B15}" type="datetimeFigureOut">
               <a:rPr lang="en-GB" smtClean="0"/>
               <a:pPr/>
-              <a:t>19/11/2025</a:t>
+              <a:t>23/11/2025</a:t>
             </a:fld>
             <a:endParaRPr lang="en-GB"/>
           </a:p>
@@ -5715,7 +5715,22 @@
                 <a:ea typeface="Calibri" panose="020F0502020204030204" pitchFamily="34" charset="0"/>
                 <a:cs typeface="Arial" panose="020B0604020202020204" pitchFamily="34" charset="0"/>
               </a:rPr>
-              <a:t>seasons</a:t>
+              <a:t>seasons </a:t>
+            </a:r>
+            <a:r>
+              <a:rPr lang="en-IE" sz="1800" b="0" spc="0">
+                <a:latin typeface="Arial" panose="020B0604020202020204" pitchFamily="34" charset="0"/>
+                <a:ea typeface="Calibri" panose="020F0502020204030204" pitchFamily="34" charset="0"/>
+                <a:cs typeface="Arial" panose="020B0604020202020204" pitchFamily="34" charset="0"/>
+              </a:rPr>
+              <a:t>in London from </a:t>
+            </a:r>
+            <a:r>
+              <a:rPr lang="en-GB" sz="1800" b="0" spc="0">
+                <a:latin typeface="Arial" panose="020B0604020202020204" pitchFamily="34" charset="0"/>
+                <a:cs typeface="Arial" panose="020B0604020202020204" pitchFamily="34" charset="0"/>
+              </a:rPr>
+              <a:t>1979 to 2020</a:t>
             </a:r>
             <a:r>
               <a:rPr lang="en-IE" sz="1800" b="0" spc="0">
@@ -7126,23 +7141,6 @@
 </file>
 
 <file path=customXml/item1.xml><?xml version="1.0" encoding="utf-8"?>
-<p:properties xmlns:p="http://schemas.microsoft.com/office/2006/metadata/properties" xmlns:xsi="http://www.w3.org/2001/XMLSchema-instance" xmlns:pc="http://schemas.microsoft.com/office/infopath/2007/PartnerControls">
-  <documentManagement>
-    <Information xmlns="4ad138b4-2b68-4b70-945d-07f8f18b1c9a" xsi:nil="true"/>
-  </documentManagement>
-</p:properties>
-</file>
-
-<file path=customXml/item2.xml><?xml version="1.0" encoding="utf-8"?>
-<?mso-contentType ?>
-<FormTemplates xmlns="http://schemas.microsoft.com/sharepoint/v3/contenttype/forms">
-  <Display>DocumentLibraryForm</Display>
-  <Edit>DocumentLibraryForm</Edit>
-  <New>DocumentLibraryForm</New>
-</FormTemplates>
-</file>
-
-<file path=customXml/item3.xml><?xml version="1.0" encoding="utf-8"?>
 <ct:contentTypeSchema xmlns:ct="http://schemas.microsoft.com/office/2006/metadata/contentType" xmlns:ma="http://schemas.microsoft.com/office/2006/metadata/properties/metaAttributes" ct:_="" ma:_="" ma:contentTypeName="Document" ma:contentTypeID="0x01010026DBA85F447B164191BB36C258697B67" ma:contentTypeVersion="14" ma:contentTypeDescription="Create a new document." ma:contentTypeScope="" ma:versionID="ea511d05ca7f895fe9556935b5c9af34">
   <xsd:schema xmlns:xsd="http://www.w3.org/2001/XMLSchema" xmlns:xs="http://www.w3.org/2001/XMLSchema" xmlns:p="http://schemas.microsoft.com/office/2006/metadata/properties" xmlns:ns2="4ad138b4-2b68-4b70-945d-07f8f18b1c9a" xmlns:ns3="3c474641-ec36-472f-b125-6b1b0910eaa4" targetNamespace="http://schemas.microsoft.com/office/2006/metadata/properties" ma:root="true" ma:fieldsID="662270106d7a7e100bcac2c5f8d29899" ns2:_="" ns3:_="">
     <xsd:import namespace="4ad138b4-2b68-4b70-945d-07f8f18b1c9a"/>
@@ -7367,32 +7365,24 @@
 </ct:contentTypeSchema>
 </file>
 
-<file path=customXml/itemProps1.xml><?xml version="1.0" encoding="utf-8"?>
-<ds:datastoreItem xmlns:ds="http://schemas.openxmlformats.org/officeDocument/2006/customXml" ds:itemID="{EDD1FC41-23C7-41B0-B5F9-BF4CD38AD2ED}">
-  <ds:schemaRefs>
-    <ds:schemaRef ds:uri="3c474641-ec36-472f-b125-6b1b0910eaa4"/>
-    <ds:schemaRef ds:uri="4ad138b4-2b68-4b70-945d-07f8f18b1c9a"/>
-    <ds:schemaRef ds:uri="http://purl.org/dc/dcmitype/"/>
-    <ds:schemaRef ds:uri="http://purl.org/dc/elements/1.1/"/>
-    <ds:schemaRef ds:uri="http://purl.org/dc/terms/"/>
-    <ds:schemaRef ds:uri="http://schemas.microsoft.com/office/2006/documentManagement/types"/>
-    <ds:schemaRef ds:uri="http://schemas.microsoft.com/office/2006/metadata/properties"/>
-    <ds:schemaRef ds:uri="http://schemas.microsoft.com/office/infopath/2007/PartnerControls"/>
-    <ds:schemaRef ds:uri="http://schemas.openxmlformats.org/package/2006/metadata/core-properties"/>
-    <ds:schemaRef ds:uri="http://www.w3.org/XML/1998/namespace"/>
-  </ds:schemaRefs>
-</ds:datastoreItem>
+<file path=customXml/item2.xml><?xml version="1.0" encoding="utf-8"?>
+<?mso-contentType ?>
+<FormTemplates xmlns="http://schemas.microsoft.com/sharepoint/v3/contenttype/forms">
+  <Display>DocumentLibraryForm</Display>
+  <Edit>DocumentLibraryForm</Edit>
+  <New>DocumentLibraryForm</New>
+</FormTemplates>
 </file>
 
-<file path=customXml/itemProps2.xml><?xml version="1.0" encoding="utf-8"?>
-<ds:datastoreItem xmlns:ds="http://schemas.openxmlformats.org/officeDocument/2006/customXml" ds:itemID="{91C521DD-2673-4EE6-BB9B-DC5C3320FFBB}">
-  <ds:schemaRefs>
-    <ds:schemaRef ds:uri="http://schemas.microsoft.com/sharepoint/v3/contenttype/forms"/>
-  </ds:schemaRefs>
-</ds:datastoreItem>
+<file path=customXml/item3.xml><?xml version="1.0" encoding="utf-8"?>
+<p:properties xmlns:p="http://schemas.microsoft.com/office/2006/metadata/properties" xmlns:xsi="http://www.w3.org/2001/XMLSchema-instance" xmlns:pc="http://schemas.microsoft.com/office/infopath/2007/PartnerControls">
+  <documentManagement>
+    <Information xmlns="4ad138b4-2b68-4b70-945d-07f8f18b1c9a" xsi:nil="true"/>
+  </documentManagement>
+</p:properties>
 </file>
 
-<file path=customXml/itemProps3.xml><?xml version="1.0" encoding="utf-8"?>
+<file path=customXml/itemProps1.xml><?xml version="1.0" encoding="utf-8"?>
 <ds:datastoreItem xmlns:ds="http://schemas.openxmlformats.org/officeDocument/2006/customXml" ds:itemID="{421B8C57-903D-4D0E-8336-7B512F760CD1}">
   <ds:schemaRefs>
     <ds:schemaRef ds:uri="3c474641-ec36-472f-b125-6b1b0910eaa4"/>
@@ -7409,4 +7399,29 @@
     <ds:schemaRef ds:uri="http://www.w3.org/2001/XMLSchema"/>
   </ds:schemaRefs>
 </ds:datastoreItem>
+</file>
+
+<file path=customXml/itemProps2.xml><?xml version="1.0" encoding="utf-8"?>
+<ds:datastoreItem xmlns:ds="http://schemas.openxmlformats.org/officeDocument/2006/customXml" ds:itemID="{91C521DD-2673-4EE6-BB9B-DC5C3320FFBB}">
+  <ds:schemaRefs>
+    <ds:schemaRef ds:uri="http://schemas.microsoft.com/sharepoint/v3/contenttype/forms"/>
+  </ds:schemaRefs>
+</ds:datastoreItem>
+</file>
+
+<file path=customXml/itemProps3.xml><?xml version="1.0" encoding="utf-8"?>
+<ds:datastoreItem xmlns:ds="http://schemas.openxmlformats.org/officeDocument/2006/customXml" ds:itemID="{EDD1FC41-23C7-41B0-B5F9-BF4CD38AD2ED}">
+  <ds:schemaRefs>
+    <ds:schemaRef ds:uri="3c474641-ec36-472f-b125-6b1b0910eaa4"/>
+    <ds:schemaRef ds:uri="4ad138b4-2b68-4b70-945d-07f8f18b1c9a"/>
+    <ds:schemaRef ds:uri="http://purl.org/dc/dcmitype/"/>
+    <ds:schemaRef ds:uri="http://purl.org/dc/elements/1.1/"/>
+    <ds:schemaRef ds:uri="http://purl.org/dc/terms/"/>
+    <ds:schemaRef ds:uri="http://schemas.microsoft.com/office/2006/documentManagement/types"/>
+    <ds:schemaRef ds:uri="http://schemas.microsoft.com/office/2006/metadata/properties"/>
+    <ds:schemaRef ds:uri="http://schemas.microsoft.com/office/infopath/2007/PartnerControls"/>
+    <ds:schemaRef ds:uri="http://schemas.openxmlformats.org/package/2006/metadata/core-properties"/>
+    <ds:schemaRef ds:uri="http://www.w3.org/XML/1998/namespace"/>
+  </ds:schemaRefs>
+</ds:datastoreItem>
 </file>
</xml_diff>